<commit_message>
Final changes to Powerpoint.
</commit_message>
<xml_diff>
--- a/intro-to-APIs.pptx
+++ b/intro-to-APIs.pptx
@@ -2,45 +2,53 @@
 <file path=ppt/presentation.xml><?xml version="1.0" encoding="utf-8"?>
 <p:presentation xmlns:a="http://schemas.openxmlformats.org/drawingml/2006/main" xmlns:r="http://schemas.openxmlformats.org/officeDocument/2006/relationships" xmlns:p="http://schemas.openxmlformats.org/presentationml/2006/main" strictFirstAndLastChars="0" embedTrueTypeFonts="1" saveSubsetFonts="1" autoCompressPictures="0">
   <p:sldMasterIdLst>
-    <p:sldMasterId id="2147483659" r:id="rId1"/>
+    <p:sldMasterId id="2147483659" r:id="rId4"/>
   </p:sldMasterIdLst>
   <p:notesMasterIdLst>
-    <p:notesMasterId r:id="rId21"/>
+    <p:notesMasterId r:id="rId25"/>
   </p:notesMasterIdLst>
   <p:sldIdLst>
-    <p:sldId id="258" r:id="rId2"/>
-    <p:sldId id="260" r:id="rId3"/>
-    <p:sldId id="271" r:id="rId4"/>
-    <p:sldId id="263" r:id="rId5"/>
-    <p:sldId id="261" r:id="rId6"/>
-    <p:sldId id="265" r:id="rId7"/>
-    <p:sldId id="266" r:id="rId8"/>
-    <p:sldId id="291" r:id="rId9"/>
-    <p:sldId id="276" r:id="rId10"/>
-    <p:sldId id="292" r:id="rId11"/>
-    <p:sldId id="293" r:id="rId12"/>
-    <p:sldId id="294" r:id="rId13"/>
-    <p:sldId id="279" r:id="rId14"/>
-    <p:sldId id="295" r:id="rId15"/>
-    <p:sldId id="296" r:id="rId16"/>
-    <p:sldId id="286" r:id="rId17"/>
-    <p:sldId id="287" r:id="rId18"/>
-    <p:sldId id="289" r:id="rId19"/>
-    <p:sldId id="290" r:id="rId20"/>
+    <p:sldId id="258" r:id="rId5"/>
+    <p:sldId id="260" r:id="rId6"/>
+    <p:sldId id="271" r:id="rId7"/>
+    <p:sldId id="263" r:id="rId8"/>
+    <p:sldId id="261" r:id="rId9"/>
+    <p:sldId id="265" r:id="rId10"/>
+    <p:sldId id="266" r:id="rId11"/>
+    <p:sldId id="291" r:id="rId12"/>
+    <p:sldId id="276" r:id="rId13"/>
+    <p:sldId id="292" r:id="rId14"/>
+    <p:sldId id="293" r:id="rId15"/>
+    <p:sldId id="294" r:id="rId16"/>
+    <p:sldId id="279" r:id="rId17"/>
+    <p:sldId id="295" r:id="rId18"/>
+    <p:sldId id="296" r:id="rId19"/>
+    <p:sldId id="286" r:id="rId20"/>
+    <p:sldId id="287" r:id="rId21"/>
+    <p:sldId id="297" r:id="rId22"/>
+    <p:sldId id="289" r:id="rId23"/>
+    <p:sldId id="290" r:id="rId24"/>
   </p:sldIdLst>
   <p:sldSz cx="9144000" cy="5143500" type="screen16x9"/>
   <p:notesSz cx="6858000" cy="9144000"/>
   <p:embeddedFontLst>
     <p:embeddedFont>
       <p:font typeface="Cabin" panose="020B0604020202020204" charset="0"/>
-      <p:regular r:id="rId22"/>
-      <p:bold r:id="rId23"/>
-      <p:italic r:id="rId24"/>
-      <p:boldItalic r:id="rId25"/>
+      <p:regular r:id="rId26"/>
+      <p:bold r:id="rId27"/>
+      <p:italic r:id="rId28"/>
+      <p:boldItalic r:id="rId29"/>
+    </p:embeddedFont>
+    <p:embeddedFont>
+      <p:font typeface="Helvetica" panose="020B0604020202020204" pitchFamily="34" charset="0"/>
+      <p:regular r:id="rId30"/>
+      <p:bold r:id="rId31"/>
+      <p:italic r:id="rId32"/>
+      <p:boldItalic r:id="rId33"/>
     </p:embeddedFont>
     <p:embeddedFont>
       <p:font typeface="Shadows Into Light" panose="020B0604020202020204" charset="0"/>
-      <p:regular r:id="rId26"/>
+      <p:regular r:id="rId34"/>
     </p:embeddedFont>
   </p:embeddedFontLst>
   <p:defaultTextStyle>
@@ -1065,7 +1073,7 @@
               <a:buSzPts val="1100"/>
               <a:buNone/>
             </a:pPr>
-            <a:endParaRPr/>
+            <a:endParaRPr dirty="0"/>
           </a:p>
         </p:txBody>
       </p:sp>
@@ -2042,7 +2050,7 @@
   <p:cSld>
     <p:spTree>
       <p:nvGrpSpPr>
-        <p:cNvPr id="1" name="Shape 560"/>
+        <p:cNvPr id="1" name="Shape 546"/>
         <p:cNvGrpSpPr/>
         <p:nvPr/>
       </p:nvGrpSpPr>
@@ -2056,7 +2064,7 @@
       </p:grpSpPr>
       <p:sp>
         <p:nvSpPr>
-          <p:cNvPr id="561" name="Google Shape;561;p32:notes"/>
+          <p:cNvPr id="547" name="Google Shape;547;p30:notes"/>
           <p:cNvSpPr txBox="1">
             <a:spLocks noGrp="1"/>
           </p:cNvSpPr>
@@ -2094,7 +2102,7 @@
       </p:sp>
       <p:sp>
         <p:nvSpPr>
-          <p:cNvPr id="562" name="Google Shape;562;p32:notes"/>
+          <p:cNvPr id="548" name="Google Shape;548;p30:notes"/>
           <p:cNvSpPr>
             <a:spLocks noGrp="1" noRot="1" noChangeAspect="1"/>
           </p:cNvSpPr>
@@ -2134,6 +2142,11 @@
         </p:spPr>
       </p:sp>
     </p:spTree>
+    <p:extLst>
+      <p:ext uri="{BB962C8B-B14F-4D97-AF65-F5344CB8AC3E}">
+        <p14:creationId xmlns:p14="http://schemas.microsoft.com/office/powerpoint/2010/main" val="1063505106"/>
+      </p:ext>
+    </p:extLst>
   </p:cSld>
   <p:clrMapOvr>
     <a:masterClrMapping/>
@@ -2146,7 +2159,7 @@
   <p:cSld>
     <p:spTree>
       <p:nvGrpSpPr>
-        <p:cNvPr id="1" name="Shape 566"/>
+        <p:cNvPr id="1" name="Shape 560"/>
         <p:cNvGrpSpPr/>
         <p:nvPr/>
       </p:nvGrpSpPr>
@@ -2160,7 +2173,7 @@
       </p:grpSpPr>
       <p:sp>
         <p:nvSpPr>
-          <p:cNvPr id="567" name="Google Shape;567;p33:notes"/>
+          <p:cNvPr id="561" name="Google Shape;561;p32:notes"/>
           <p:cNvSpPr txBox="1">
             <a:spLocks noGrp="1"/>
           </p:cNvSpPr>
@@ -2198,7 +2211,7 @@
       </p:sp>
       <p:sp>
         <p:nvSpPr>
-          <p:cNvPr id="568" name="Google Shape;568;p33:notes"/>
+          <p:cNvPr id="562" name="Google Shape;562;p32:notes"/>
           <p:cNvSpPr>
             <a:spLocks noGrp="1" noRot="1" noChangeAspect="1"/>
           </p:cNvSpPr>
@@ -2303,6 +2316,110 @@
       <p:sp>
         <p:nvSpPr>
           <p:cNvPr id="138" name="Google Shape;138;p5:notes"/>
+          <p:cNvSpPr>
+            <a:spLocks noGrp="1" noRot="1" noChangeAspect="1"/>
+          </p:cNvSpPr>
+          <p:nvPr>
+            <p:ph type="sldImg" idx="2"/>
+          </p:nvPr>
+        </p:nvSpPr>
+        <p:spPr>
+          <a:xfrm>
+            <a:off x="381000" y="685800"/>
+            <a:ext cx="6096000" cy="3429000"/>
+          </a:xfrm>
+          <a:custGeom>
+            <a:avLst/>
+            <a:gdLst/>
+            <a:ahLst/>
+            <a:cxnLst/>
+            <a:rect l="l" t="t" r="r" b="b"/>
+            <a:pathLst>
+              <a:path w="120000" h="120000" extrusionOk="0">
+                <a:moveTo>
+                  <a:pt x="0" y="0"/>
+                </a:moveTo>
+                <a:lnTo>
+                  <a:pt x="120000" y="0"/>
+                </a:lnTo>
+                <a:lnTo>
+                  <a:pt x="120000" y="120000"/>
+                </a:lnTo>
+                <a:lnTo>
+                  <a:pt x="0" y="120000"/>
+                </a:lnTo>
+                <a:close/>
+              </a:path>
+            </a:pathLst>
+          </a:custGeom>
+        </p:spPr>
+      </p:sp>
+    </p:spTree>
+  </p:cSld>
+  <p:clrMapOvr>
+    <a:masterClrMapping/>
+  </p:clrMapOvr>
+</p:notes>
+</file>
+
+<file path=ppt/notesSlides/notesSlide20.xml><?xml version="1.0" encoding="utf-8"?>
+<p:notes xmlns:a="http://schemas.openxmlformats.org/drawingml/2006/main" xmlns:r="http://schemas.openxmlformats.org/officeDocument/2006/relationships" xmlns:p="http://schemas.openxmlformats.org/presentationml/2006/main" showMasterSp="0" showMasterPhAnim="0">
+  <p:cSld>
+    <p:spTree>
+      <p:nvGrpSpPr>
+        <p:cNvPr id="1" name="Shape 566"/>
+        <p:cNvGrpSpPr/>
+        <p:nvPr/>
+      </p:nvGrpSpPr>
+      <p:grpSpPr>
+        <a:xfrm>
+          <a:off x="0" y="0"/>
+          <a:ext cx="0" cy="0"/>
+          <a:chOff x="0" y="0"/>
+          <a:chExt cx="0" cy="0"/>
+        </a:xfrm>
+      </p:grpSpPr>
+      <p:sp>
+        <p:nvSpPr>
+          <p:cNvPr id="567" name="Google Shape;567;p33:notes"/>
+          <p:cNvSpPr txBox="1">
+            <a:spLocks noGrp="1"/>
+          </p:cNvSpPr>
+          <p:nvPr>
+            <p:ph type="body" idx="1"/>
+          </p:nvPr>
+        </p:nvSpPr>
+        <p:spPr>
+          <a:xfrm>
+            <a:off x="685800" y="4343400"/>
+            <a:ext cx="5486400" cy="4114800"/>
+          </a:xfrm>
+          <a:prstGeom prst="rect">
+            <a:avLst/>
+          </a:prstGeom>
+        </p:spPr>
+        <p:txBody>
+          <a:bodyPr spcFirstLastPara="1" wrap="square" lIns="91425" tIns="91425" rIns="91425" bIns="91425" anchor="t" anchorCtr="0">
+            <a:noAutofit/>
+          </a:bodyPr>
+          <a:lstStyle/>
+          <a:p>
+            <a:pPr marL="0" lvl="0" indent="0" algn="l" rtl="0">
+              <a:spcBef>
+                <a:spcPts val="0"/>
+              </a:spcBef>
+              <a:spcAft>
+                <a:spcPts val="0"/>
+              </a:spcAft>
+              <a:buNone/>
+            </a:pPr>
+            <a:endParaRPr/>
+          </a:p>
+        </p:txBody>
+      </p:sp>
+      <p:sp>
+        <p:nvSpPr>
+          <p:cNvPr id="568" name="Google Shape;568;p33:notes"/>
           <p:cNvSpPr>
             <a:spLocks noGrp="1" noRot="1" noChangeAspect="1"/>
           </p:cNvSpPr>
@@ -4009,7 +4126,7 @@
             </a:lvl9pPr>
           </a:lstStyle>
           <a:p>
-            <a:endParaRPr/>
+            <a:endParaRPr dirty="0"/>
           </a:p>
         </p:txBody>
       </p:sp>
@@ -4277,7 +4394,7 @@
             </a:lvl9pPr>
           </a:lstStyle>
           <a:p>
-            <a:endParaRPr/>
+            <a:endParaRPr dirty="0"/>
           </a:p>
         </p:txBody>
       </p:sp>
@@ -5045,7 +5162,7 @@
               <a:buNone/>
             </a:pPr>
             <a:r>
-              <a:rPr lang="en-US" sz="1000">
+              <a:rPr lang="en-US" sz="1000" dirty="0">
                 <a:solidFill>
                   <a:srgbClr val="073763"/>
                 </a:solidFill>
@@ -5054,9 +5171,9 @@
                 <a:cs typeface="Cabin"/>
                 <a:sym typeface="Cabin"/>
               </a:rPr>
-              <a:t>© 2019 Anderson Technology Business Association. All Rights Reserved.</a:t>
+              <a:t>© 2021 Tech Business Association @ Anderson. All Rights Reserved.</a:t>
             </a:r>
-            <a:endParaRPr sz="1000" b="0" i="0" u="none" strike="noStrike" cap="none">
+            <a:endParaRPr sz="1000" b="0" i="0" u="none" strike="noStrike" cap="none" dirty="0">
               <a:solidFill>
                 <a:srgbClr val="073763"/>
               </a:solidFill>
@@ -6095,10 +6212,10 @@
               <a:buSzPts val="5200"/>
               <a:buFont typeface="Shadows Into Light"/>
               <a:buNone/>
-              <a:defRPr sz="5200">
-                <a:latin typeface="Shadows Into Light"/>
-                <a:ea typeface="Shadows Into Light"/>
-                <a:cs typeface="Shadows Into Light"/>
+              <a:defRPr sz="5200" b="0" i="0">
+                <a:latin typeface="Helvetica" pitchFamily="2" charset="0"/>
+                <a:ea typeface="Helvetica" pitchFamily="2" charset="0"/>
+                <a:cs typeface="Helvetica" pitchFamily="2" charset="0"/>
                 <a:sym typeface="Shadows Into Light"/>
               </a:defRPr>
             </a:lvl1pPr>
@@ -6216,7 +6333,7 @@
             </a:lvl9pPr>
           </a:lstStyle>
           <a:p>
-            <a:endParaRPr/>
+            <a:endParaRPr dirty="0"/>
           </a:p>
         </p:txBody>
       </p:sp>
@@ -6261,10 +6378,10 @@
               <a:buSzPts val="2800"/>
               <a:buFont typeface="Shadows Into Light"/>
               <a:buNone/>
-              <a:defRPr sz="2800">
-                <a:latin typeface="Shadows Into Light"/>
-                <a:ea typeface="Shadows Into Light"/>
-                <a:cs typeface="Shadows Into Light"/>
+              <a:defRPr sz="2800" b="0" i="0">
+                <a:latin typeface="Helvetica" pitchFamily="2" charset="0"/>
+                <a:ea typeface="Helvetica" pitchFamily="2" charset="0"/>
+                <a:cs typeface="Helvetica" pitchFamily="2" charset="0"/>
                 <a:sym typeface="Shadows Into Light"/>
               </a:defRPr>
             </a:lvl1pPr>
@@ -6382,37 +6499,10 @@
             </a:lvl9pPr>
           </a:lstStyle>
           <a:p>
-            <a:endParaRPr/>
+            <a:endParaRPr dirty="0"/>
           </a:p>
         </p:txBody>
       </p:sp>
-      <p:pic>
-        <p:nvPicPr>
-          <p:cNvPr id="33" name="Google Shape;33;p3"/>
-          <p:cNvPicPr preferRelativeResize="0"/>
-          <p:nvPr/>
-        </p:nvPicPr>
-        <p:blipFill rotWithShape="1">
-          <a:blip r:embed="rId3">
-            <a:alphaModFix/>
-          </a:blip>
-          <a:srcRect/>
-          <a:stretch/>
-        </p:blipFill>
-        <p:spPr>
-          <a:xfrm>
-            <a:off x="76226" y="76200"/>
-            <a:ext cx="2826695" cy="800900"/>
-          </a:xfrm>
-          <a:prstGeom prst="rect">
-            <a:avLst/>
-          </a:prstGeom>
-          <a:noFill/>
-          <a:ln>
-            <a:noFill/>
-          </a:ln>
-        </p:spPr>
-      </p:pic>
       <p:cxnSp>
         <p:nvCxnSpPr>
           <p:cNvPr id="34" name="Google Shape;34;p3"/>
@@ -7153,7 +7243,7 @@
               <a:buNone/>
             </a:pPr>
             <a:r>
-              <a:rPr lang="en-US" sz="1000">
+              <a:rPr lang="en-US" sz="1000" dirty="0">
                 <a:solidFill>
                   <a:srgbClr val="073763"/>
                 </a:solidFill>
@@ -7162,9 +7252,9 @@
                 <a:cs typeface="Cabin"/>
                 <a:sym typeface="Cabin"/>
               </a:rPr>
-              <a:t>© 2019 Anderson Technology Business Association. All Rights Reserved.</a:t>
+              <a:t>© 2021 Tech Business Association @ Anderson. All Rights Reserved.</a:t>
             </a:r>
-            <a:endParaRPr sz="1000" b="0" i="0" u="none" strike="noStrike" cap="none">
+            <a:endParaRPr sz="1000" b="0" i="0" u="none" strike="noStrike" cap="none" dirty="0">
               <a:solidFill>
                 <a:srgbClr val="073763"/>
               </a:solidFill>
@@ -7176,6 +7266,36 @@
           </a:p>
         </p:txBody>
       </p:sp>
+      <p:pic>
+        <p:nvPicPr>
+          <p:cNvPr id="2" name="Picture 1">
+            <a:extLst>
+              <a:ext uri="{FF2B5EF4-FFF2-40B4-BE49-F238E27FC236}">
+                <a16:creationId xmlns:a16="http://schemas.microsoft.com/office/drawing/2014/main" id="{9EA10B54-61BF-BC41-82E1-C676EA0176C3}"/>
+              </a:ext>
+            </a:extLst>
+          </p:cNvPr>
+          <p:cNvPicPr>
+            <a:picLocks noChangeAspect="1"/>
+          </p:cNvPicPr>
+          <p:nvPr userDrawn="1"/>
+        </p:nvPicPr>
+        <p:blipFill>
+          <a:blip r:embed="rId3"/>
+          <a:stretch>
+            <a:fillRect/>
+          </a:stretch>
+        </p:blipFill>
+        <p:spPr>
+          <a:xfrm>
+            <a:off x="80863" y="24954"/>
+            <a:ext cx="2488165" cy="1277258"/>
+          </a:xfrm>
+          <a:prstGeom prst="rect">
+            <a:avLst/>
+          </a:prstGeom>
+        </p:spPr>
+      </p:pic>
     </p:spTree>
   </p:cSld>
   <p:clrMapOvr>
@@ -7269,10 +7389,10 @@
               <a:buSzPts val="3600"/>
               <a:buFont typeface="Shadows Into Light"/>
               <a:buNone/>
-              <a:defRPr sz="3600">
-                <a:latin typeface="Shadows Into Light"/>
-                <a:ea typeface="Shadows Into Light"/>
-                <a:cs typeface="Shadows Into Light"/>
+              <a:defRPr sz="3600" b="0" i="0">
+                <a:latin typeface="Helvetica" pitchFamily="2" charset="0"/>
+                <a:ea typeface="Helvetica" pitchFamily="2" charset="0"/>
+                <a:cs typeface="Helvetica" pitchFamily="2" charset="0"/>
                 <a:sym typeface="Shadows Into Light"/>
               </a:defRPr>
             </a:lvl1pPr>
@@ -7390,7 +7510,7 @@
             </a:lvl9pPr>
           </a:lstStyle>
           <a:p>
-            <a:endParaRPr/>
+            <a:endParaRPr dirty="0"/>
           </a:p>
         </p:txBody>
       </p:sp>
@@ -7810,33 +7930,6 @@
           </a:ln>
         </p:spPr>
       </p:cxnSp>
-      <p:pic>
-        <p:nvPicPr>
-          <p:cNvPr id="67" name="Google Shape;67;p4"/>
-          <p:cNvPicPr preferRelativeResize="0"/>
-          <p:nvPr/>
-        </p:nvPicPr>
-        <p:blipFill rotWithShape="1">
-          <a:blip r:embed="rId3">
-            <a:alphaModFix/>
-          </a:blip>
-          <a:srcRect r="72664"/>
-          <a:stretch/>
-        </p:blipFill>
-        <p:spPr>
-          <a:xfrm>
-            <a:off x="76226" y="76200"/>
-            <a:ext cx="772700" cy="800900"/>
-          </a:xfrm>
-          <a:prstGeom prst="rect">
-            <a:avLst/>
-          </a:prstGeom>
-          <a:noFill/>
-          <a:ln>
-            <a:noFill/>
-          </a:ln>
-        </p:spPr>
-      </p:pic>
       <p:sp>
         <p:nvSpPr>
           <p:cNvPr id="68" name="Google Shape;68;p4"/>
@@ -8161,7 +8254,7 @@
               <a:buNone/>
             </a:pPr>
             <a:r>
-              <a:rPr lang="en-US" sz="1000">
+              <a:rPr lang="en-US" sz="1000" dirty="0">
                 <a:solidFill>
                   <a:srgbClr val="073763"/>
                 </a:solidFill>
@@ -8170,9 +8263,9 @@
                 <a:cs typeface="Cabin"/>
                 <a:sym typeface="Cabin"/>
               </a:rPr>
-              <a:t>© 2019 Anderson Technology Business Association. All Rights Reserved.</a:t>
+              <a:t>© 2021 Tech Business Association @ Anderson. All Rights Reserved.</a:t>
             </a:r>
-            <a:endParaRPr sz="1000" b="0" i="0" u="none" strike="noStrike" cap="none">
+            <a:endParaRPr sz="1000" b="0" i="0" u="none" strike="noStrike" cap="none" dirty="0">
               <a:solidFill>
                 <a:srgbClr val="073763"/>
               </a:solidFill>
@@ -8184,6 +8277,35 @@
           </a:p>
         </p:txBody>
       </p:sp>
+      <p:pic>
+        <p:nvPicPr>
+          <p:cNvPr id="21" name="Picture 20">
+            <a:extLst>
+              <a:ext uri="{FF2B5EF4-FFF2-40B4-BE49-F238E27FC236}">
+                <a16:creationId xmlns:a16="http://schemas.microsoft.com/office/drawing/2014/main" id="{279B78EE-38CE-6047-9CD6-EF09F02BC746}"/>
+              </a:ext>
+            </a:extLst>
+          </p:cNvPr>
+          <p:cNvPicPr>
+            <a:picLocks noChangeAspect="1"/>
+          </p:cNvPicPr>
+          <p:nvPr userDrawn="1"/>
+        </p:nvPicPr>
+        <p:blipFill rotWithShape="1">
+          <a:blip r:embed="rId3"/>
+          <a:srcRect r="67384" b="33319"/>
+          <a:stretch/>
+        </p:blipFill>
+        <p:spPr>
+          <a:xfrm>
+            <a:off x="80864" y="24954"/>
+            <a:ext cx="811534" cy="851684"/>
+          </a:xfrm>
+          <a:prstGeom prst="rect">
+            <a:avLst/>
+          </a:prstGeom>
+        </p:spPr>
+      </p:pic>
     </p:spTree>
   </p:cSld>
   <p:clrMapOvr>
@@ -13286,6 +13408,14 @@
 <file path=ppt/slides/slide1.xml><?xml version="1.0" encoding="utf-8"?>
 <p:sld xmlns:a="http://schemas.openxmlformats.org/drawingml/2006/main" xmlns:r="http://schemas.openxmlformats.org/officeDocument/2006/relationships" xmlns:p="http://schemas.openxmlformats.org/presentationml/2006/main">
   <p:cSld>
+    <p:bg>
+      <p:bgPr>
+        <a:solidFill>
+          <a:schemeClr val="lt1"/>
+        </a:solidFill>
+        <a:effectLst/>
+      </p:bgPr>
+    </p:bg>
     <p:spTree>
       <p:nvGrpSpPr>
         <p:cNvPr id="1" name="Shape 126"/>
@@ -13311,10 +13441,6 @@
           </p:nvPr>
         </p:nvSpPr>
         <p:spPr>
-          <a:xfrm>
-            <a:off x="311708" y="744575"/>
-            <a:ext cx="8520600" cy="2052600"/>
-          </a:xfrm>
           <a:prstGeom prst="rect">
             <a:avLst/>
           </a:prstGeom>
@@ -13361,10 +13487,6 @@
           </p:nvPr>
         </p:nvSpPr>
         <p:spPr>
-          <a:xfrm>
-            <a:off x="0" y="2797175"/>
-            <a:ext cx="9144000" cy="792600"/>
-          </a:xfrm>
           <a:prstGeom prst="rect">
             <a:avLst/>
           </a:prstGeom>
@@ -13394,9 +13516,8 @@
             </a:pPr>
             <a:r>
               <a:rPr lang="en-US" dirty="0"/>
-              <a:t>Josh Kimmel</a:t>
+              <a:t>Josh Kimmel </a:t>
             </a:r>
-            <a:endParaRPr dirty="0"/>
           </a:p>
           <a:p>
             <a:pPr marL="0" lvl="0" indent="0" algn="ctr" rtl="0">
@@ -13414,7 +13535,7 @@
             </a:pPr>
             <a:r>
               <a:rPr lang="en-US" dirty="0"/>
-              <a:t>MSCS/MBA</a:t>
+              <a:t>MSCS/MBA ‘21</a:t>
             </a:r>
             <a:endParaRPr dirty="0"/>
           </a:p>
@@ -13431,10 +13552,6 @@
           </p:nvPr>
         </p:nvSpPr>
         <p:spPr>
-          <a:xfrm>
-            <a:off x="8595308" y="4825067"/>
-            <a:ext cx="548700" cy="393600"/>
-          </a:xfrm>
           <a:prstGeom prst="rect">
             <a:avLst/>
           </a:prstGeom>
@@ -13507,10 +13624,6 @@
           </p:nvPr>
         </p:nvSpPr>
         <p:spPr>
-          <a:xfrm>
-            <a:off x="311700" y="2150850"/>
-            <a:ext cx="8520600" cy="841800"/>
-          </a:xfrm>
           <a:prstGeom prst="rect">
             <a:avLst/>
           </a:prstGeom>
@@ -13558,10 +13671,6 @@
           </p:nvPr>
         </p:nvSpPr>
         <p:spPr>
-          <a:xfrm>
-            <a:off x="8595308" y="4825067"/>
-            <a:ext cx="548700" cy="393600"/>
-          </a:xfrm>
           <a:prstGeom prst="rect">
             <a:avLst/>
           </a:prstGeom>
@@ -13639,10 +13748,6 @@
           </p:nvPr>
         </p:nvSpPr>
         <p:spPr>
-          <a:xfrm>
-            <a:off x="311700" y="445025"/>
-            <a:ext cx="8520600" cy="572700"/>
-          </a:xfrm>
           <a:prstGeom prst="rect">
             <a:avLst/>
           </a:prstGeom>
@@ -13786,10 +13891,6 @@
           </p:nvPr>
         </p:nvSpPr>
         <p:spPr>
-          <a:xfrm>
-            <a:off x="8595308" y="4825067"/>
-            <a:ext cx="548700" cy="393600"/>
-          </a:xfrm>
           <a:prstGeom prst="rect">
             <a:avLst/>
           </a:prstGeom>
@@ -14033,10 +14134,6 @@
           </p:nvPr>
         </p:nvSpPr>
         <p:spPr>
-          <a:xfrm>
-            <a:off x="311700" y="445025"/>
-            <a:ext cx="8520600" cy="572700"/>
-          </a:xfrm>
           <a:prstGeom prst="rect">
             <a:avLst/>
           </a:prstGeom>
@@ -14189,10 +14286,6 @@
           </p:nvPr>
         </p:nvSpPr>
         <p:spPr>
-          <a:xfrm>
-            <a:off x="8595308" y="4825067"/>
-            <a:ext cx="548700" cy="393600"/>
-          </a:xfrm>
           <a:prstGeom prst="rect">
             <a:avLst/>
           </a:prstGeom>
@@ -14309,10 +14402,6 @@
           </p:nvPr>
         </p:nvSpPr>
         <p:spPr>
-          <a:xfrm>
-            <a:off x="311700" y="2150850"/>
-            <a:ext cx="8520600" cy="841800"/>
-          </a:xfrm>
           <a:prstGeom prst="rect">
             <a:avLst/>
           </a:prstGeom>
@@ -14360,10 +14449,6 @@
           </p:nvPr>
         </p:nvSpPr>
         <p:spPr>
-          <a:xfrm>
-            <a:off x="8595308" y="4825067"/>
-            <a:ext cx="548700" cy="393600"/>
-          </a:xfrm>
           <a:prstGeom prst="rect">
             <a:avLst/>
           </a:prstGeom>
@@ -14436,10 +14521,6 @@
           </p:nvPr>
         </p:nvSpPr>
         <p:spPr>
-          <a:xfrm>
-            <a:off x="311700" y="445025"/>
-            <a:ext cx="8520600" cy="572700"/>
-          </a:xfrm>
           <a:prstGeom prst="rect">
             <a:avLst/>
           </a:prstGeom>
@@ -14469,10 +14550,10 @@
               <a:buNone/>
             </a:pPr>
             <a:r>
-              <a:rPr lang="en-US" dirty="0"/>
+              <a:rPr lang="en-US" b="1" dirty="0"/>
               <a:t>Stock Market Wizard</a:t>
             </a:r>
-            <a:endParaRPr dirty="0"/>
+            <a:endParaRPr b="1" dirty="0"/>
           </a:p>
         </p:txBody>
       </p:sp>
@@ -14523,7 +14604,15 @@
             </a:pPr>
             <a:r>
               <a:rPr lang="en-US" dirty="0"/>
-              <a:t>I’m an MBA student, so I should be up on the stock market.</a:t>
+              <a:t>I’m an MBA student, so I should be up on the </a:t>
+            </a:r>
+            <a:r>
+              <a:rPr lang="en-US" b="1" dirty="0"/>
+              <a:t>stock market</a:t>
+            </a:r>
+            <a:r>
+              <a:rPr lang="en-US" dirty="0"/>
+              <a:t>.</a:t>
             </a:r>
           </a:p>
           <a:p>
@@ -14567,7 +14656,31 @@
             </a:pPr>
             <a:r>
               <a:rPr lang="en-US" dirty="0"/>
-              <a:t>Let’s use API’s and Python to reconcile these diametrically opposing initiatives!</a:t>
+              <a:t>Let’s use </a:t>
+            </a:r>
+            <a:r>
+              <a:rPr lang="en-US" b="1" dirty="0">
+                <a:solidFill>
+                  <a:srgbClr val="FF0000"/>
+                </a:solidFill>
+              </a:rPr>
+              <a:t>API’s</a:t>
+            </a:r>
+            <a:r>
+              <a:rPr lang="en-US" dirty="0"/>
+              <a:t> and </a:t>
+            </a:r>
+            <a:r>
+              <a:rPr lang="en-US" b="1" dirty="0">
+                <a:solidFill>
+                  <a:srgbClr val="FF0000"/>
+                </a:solidFill>
+              </a:rPr>
+              <a:t>Python</a:t>
+            </a:r>
+            <a:r>
+              <a:rPr lang="en-US" dirty="0"/>
+              <a:t> to reconcile these diametrically opposing initiatives!</a:t>
             </a:r>
           </a:p>
           <a:p>
@@ -14621,10 +14734,6 @@
           </p:nvPr>
         </p:nvSpPr>
         <p:spPr>
-          <a:xfrm>
-            <a:off x="8595308" y="4825067"/>
-            <a:ext cx="548700" cy="393600"/>
-          </a:xfrm>
           <a:prstGeom prst="rect">
             <a:avLst/>
           </a:prstGeom>
@@ -14992,8 +15101,8 @@
         </p:nvSpPr>
         <p:spPr>
           <a:xfrm>
-            <a:off x="4680993" y="2789029"/>
-            <a:ext cx="3372533" cy="1201997"/>
+            <a:off x="3089429" y="2789029"/>
+            <a:ext cx="5974672" cy="1201997"/>
           </a:xfrm>
           <a:prstGeom prst="rect">
             <a:avLst/>
@@ -15260,12 +15369,58 @@
               <a:buNone/>
             </a:pPr>
             <a:r>
-              <a:rPr lang="en-US" dirty="0"/>
-              <a:t>[TODO – INSERT LINK TO GITHUB REPO FOR CODE]</a:t>
+              <a:rPr lang="en-US" dirty="0">
+                <a:hlinkClick r:id="rId3"/>
+              </a:rPr>
+              <a:t>https://github.com/AnderTechClub/stock-market-wizard</a:t>
             </a:r>
+            <a:endParaRPr lang="en-US" dirty="0"/>
+          </a:p>
+          <a:p>
+            <a:pPr marL="114300" indent="0">
+              <a:buFont typeface="Cabin"/>
+              <a:buNone/>
+            </a:pPr>
+            <a:endParaRPr lang="en-US" dirty="0"/>
           </a:p>
         </p:txBody>
       </p:sp>
+      <p:pic>
+        <p:nvPicPr>
+          <p:cNvPr id="5" name="Graphic 4" descr="Mining tools outline">
+            <a:extLst>
+              <a:ext uri="{FF2B5EF4-FFF2-40B4-BE49-F238E27FC236}">
+                <a16:creationId xmlns:a16="http://schemas.microsoft.com/office/drawing/2014/main" id="{126FE08A-81B6-5E43-98B5-7D3320C7E974}"/>
+              </a:ext>
+            </a:extLst>
+          </p:cNvPr>
+          <p:cNvPicPr>
+            <a:picLocks noChangeAspect="1"/>
+          </p:cNvPicPr>
+          <p:nvPr/>
+        </p:nvPicPr>
+        <p:blipFill>
+          <a:blip r:embed="rId4">
+            <a:extLst>
+              <a:ext uri="{96DAC541-7B7A-43D3-8B79-37D633B846F1}">
+                <asvg:svgBlip xmlns:asvg="http://schemas.microsoft.com/office/drawing/2016/SVG/main" r:embed="rId5"/>
+              </a:ext>
+            </a:extLst>
+          </a:blip>
+          <a:stretch>
+            <a:fillRect/>
+          </a:stretch>
+        </p:blipFill>
+        <p:spPr>
+          <a:xfrm>
+            <a:off x="1726664" y="2637856"/>
+            <a:ext cx="542604" cy="542604"/>
+          </a:xfrm>
+          <a:prstGeom prst="rect">
+            <a:avLst/>
+          </a:prstGeom>
+        </p:spPr>
+      </p:pic>
     </p:spTree>
     <p:extLst>
       <p:ext uri="{BB962C8B-B14F-4D97-AF65-F5344CB8AC3E}">
@@ -15307,10 +15462,6 @@
           </p:nvPr>
         </p:nvSpPr>
         <p:spPr>
-          <a:xfrm>
-            <a:off x="311700" y="445025"/>
-            <a:ext cx="8520600" cy="572700"/>
-          </a:xfrm>
           <a:prstGeom prst="rect">
             <a:avLst/>
           </a:prstGeom>
@@ -15462,10 +15613,6 @@
           </p:nvPr>
         </p:nvSpPr>
         <p:spPr>
-          <a:xfrm>
-            <a:off x="8595308" y="4825067"/>
-            <a:ext cx="548700" cy="393600"/>
-          </a:xfrm>
           <a:prstGeom prst="rect">
             <a:avLst/>
           </a:prstGeom>
@@ -15543,10 +15690,6 @@
           </p:nvPr>
         </p:nvSpPr>
         <p:spPr>
-          <a:xfrm>
-            <a:off x="311700" y="2150850"/>
-            <a:ext cx="8520600" cy="841800"/>
-          </a:xfrm>
           <a:prstGeom prst="rect">
             <a:avLst/>
           </a:prstGeom>
@@ -15594,10 +15737,6 @@
           </p:nvPr>
         </p:nvSpPr>
         <p:spPr>
-          <a:xfrm>
-            <a:off x="8595308" y="4825067"/>
-            <a:ext cx="548700" cy="393600"/>
-          </a:xfrm>
           <a:prstGeom prst="rect">
             <a:avLst/>
           </a:prstGeom>
@@ -15643,6 +15782,270 @@
 </file>
 
 <file path=ppt/slides/slide17.xml><?xml version="1.0" encoding="utf-8"?>
+<p:sld xmlns:a="http://schemas.openxmlformats.org/drawingml/2006/main" xmlns:r="http://schemas.openxmlformats.org/officeDocument/2006/relationships" xmlns:p="http://schemas.openxmlformats.org/presentationml/2006/main" show="0">
+  <p:cSld>
+    <p:spTree>
+      <p:nvGrpSpPr>
+        <p:cNvPr id="1" name="Shape 549"/>
+        <p:cNvGrpSpPr/>
+        <p:nvPr/>
+      </p:nvGrpSpPr>
+      <p:grpSpPr>
+        <a:xfrm>
+          <a:off x="0" y="0"/>
+          <a:ext cx="0" cy="0"/>
+          <a:chOff x="0" y="0"/>
+          <a:chExt cx="0" cy="0"/>
+        </a:xfrm>
+      </p:grpSpPr>
+      <p:sp>
+        <p:nvSpPr>
+          <p:cNvPr id="550" name="Google Shape;550;p44"/>
+          <p:cNvSpPr txBox="1">
+            <a:spLocks noGrp="1"/>
+          </p:cNvSpPr>
+          <p:nvPr>
+            <p:ph type="title"/>
+          </p:nvPr>
+        </p:nvSpPr>
+        <p:spPr>
+          <a:prstGeom prst="rect">
+            <a:avLst/>
+          </a:prstGeom>
+          <a:noFill/>
+          <a:ln>
+            <a:noFill/>
+          </a:ln>
+        </p:spPr>
+        <p:txBody>
+          <a:bodyPr spcFirstLastPara="1" wrap="square" lIns="91425" tIns="91425" rIns="91425" bIns="91425" anchor="t" anchorCtr="0">
+            <a:noAutofit/>
+          </a:bodyPr>
+          <a:lstStyle/>
+          <a:p>
+            <a:pPr marL="0" lvl="0" indent="0" algn="l" rtl="0">
+              <a:lnSpc>
+                <a:spcPct val="100000"/>
+              </a:lnSpc>
+              <a:spcBef>
+                <a:spcPts val="0"/>
+              </a:spcBef>
+              <a:spcAft>
+                <a:spcPts val="0"/>
+              </a:spcAft>
+              <a:buSzPts val="2800"/>
+              <a:buFont typeface="Cabin"/>
+              <a:buNone/>
+            </a:pPr>
+            <a:r>
+              <a:rPr lang="en-US"/>
+              <a:t>Key Takeaways</a:t>
+            </a:r>
+            <a:endParaRPr/>
+          </a:p>
+        </p:txBody>
+      </p:sp>
+      <p:sp>
+        <p:nvSpPr>
+          <p:cNvPr id="551" name="Google Shape;551;p44"/>
+          <p:cNvSpPr txBox="1">
+            <a:spLocks noGrp="1"/>
+          </p:cNvSpPr>
+          <p:nvPr>
+            <p:ph type="body" idx="1"/>
+          </p:nvPr>
+        </p:nvSpPr>
+        <p:spPr>
+          <a:prstGeom prst="rect">
+            <a:avLst/>
+          </a:prstGeom>
+          <a:noFill/>
+          <a:ln>
+            <a:noFill/>
+          </a:ln>
+        </p:spPr>
+        <p:txBody>
+          <a:bodyPr spcFirstLastPara="1" wrap="square" lIns="91425" tIns="91425" rIns="91425" bIns="91425" anchor="t" anchorCtr="0">
+            <a:noAutofit/>
+          </a:bodyPr>
+          <a:lstStyle/>
+          <a:p>
+            <a:pPr marL="457200" lvl="0" indent="-342900" algn="l" rtl="0">
+              <a:lnSpc>
+                <a:spcPct val="115000"/>
+              </a:lnSpc>
+              <a:spcBef>
+                <a:spcPts val="0"/>
+              </a:spcBef>
+              <a:spcAft>
+                <a:spcPts val="0"/>
+              </a:spcAft>
+              <a:buClr>
+                <a:srgbClr val="000000"/>
+              </a:buClr>
+              <a:buSzPts val="1800"/>
+              <a:buFont typeface="Cabin"/>
+              <a:buChar char="●"/>
+            </a:pPr>
+            <a:r>
+              <a:rPr lang="en-US" dirty="0"/>
+              <a:t>API’s are just a contract – something business-oriented folk can and should understand well!</a:t>
+            </a:r>
+            <a:endParaRPr dirty="0"/>
+          </a:p>
+          <a:p>
+            <a:pPr marL="457200" lvl="0" indent="-228600" algn="l" rtl="0">
+              <a:lnSpc>
+                <a:spcPct val="115000"/>
+              </a:lnSpc>
+              <a:spcBef>
+                <a:spcPts val="0"/>
+              </a:spcBef>
+              <a:spcAft>
+                <a:spcPts val="0"/>
+              </a:spcAft>
+              <a:buClr>
+                <a:srgbClr val="000000"/>
+              </a:buClr>
+              <a:buSzPts val="1800"/>
+              <a:buFont typeface="Cabin"/>
+              <a:buNone/>
+            </a:pPr>
+            <a:endParaRPr dirty="0"/>
+          </a:p>
+          <a:p>
+            <a:pPr marL="457200" lvl="0" indent="-342900" algn="l" rtl="0">
+              <a:lnSpc>
+                <a:spcPct val="115000"/>
+              </a:lnSpc>
+              <a:spcBef>
+                <a:spcPts val="0"/>
+              </a:spcBef>
+              <a:spcAft>
+                <a:spcPts val="0"/>
+              </a:spcAft>
+              <a:buClr>
+                <a:srgbClr val="000000"/>
+              </a:buClr>
+              <a:buSzPts val="1800"/>
+              <a:buFont typeface="Cabin"/>
+              <a:buChar char="●"/>
+            </a:pPr>
+            <a:r>
+              <a:rPr lang="en-US" dirty="0"/>
+              <a:t>There are standard parameters for these contracts that make defining them easier.</a:t>
+            </a:r>
+            <a:endParaRPr dirty="0"/>
+          </a:p>
+          <a:p>
+            <a:pPr marL="457200" lvl="0" indent="0" algn="l" rtl="0">
+              <a:lnSpc>
+                <a:spcPct val="115000"/>
+              </a:lnSpc>
+              <a:spcBef>
+                <a:spcPts val="0"/>
+              </a:spcBef>
+              <a:spcAft>
+                <a:spcPts val="0"/>
+              </a:spcAft>
+              <a:buNone/>
+            </a:pPr>
+            <a:endParaRPr dirty="0"/>
+          </a:p>
+          <a:p>
+            <a:pPr marL="457200" lvl="0" indent="-342900" algn="l" rtl="0">
+              <a:lnSpc>
+                <a:spcPct val="115000"/>
+              </a:lnSpc>
+              <a:spcBef>
+                <a:spcPts val="0"/>
+              </a:spcBef>
+              <a:spcAft>
+                <a:spcPts val="0"/>
+              </a:spcAft>
+              <a:buSzPts val="1800"/>
+              <a:buChar char="●"/>
+            </a:pPr>
+            <a:r>
+              <a:rPr lang="en-US" dirty="0"/>
+              <a:t> There are programmatic tools (ex: Python) that make working with API’s possible and, dare I even say, easy?</a:t>
+            </a:r>
+            <a:endParaRPr dirty="0"/>
+          </a:p>
+          <a:p>
+            <a:pPr marL="114300" lvl="0" indent="0" algn="l" rtl="0">
+              <a:lnSpc>
+                <a:spcPct val="115000"/>
+              </a:lnSpc>
+              <a:spcBef>
+                <a:spcPts val="0"/>
+              </a:spcBef>
+              <a:spcAft>
+                <a:spcPts val="0"/>
+              </a:spcAft>
+              <a:buSzPts val="1800"/>
+              <a:buNone/>
+            </a:pPr>
+            <a:endParaRPr dirty="0"/>
+          </a:p>
+        </p:txBody>
+      </p:sp>
+      <p:sp>
+        <p:nvSpPr>
+          <p:cNvPr id="552" name="Google Shape;552;p44"/>
+          <p:cNvSpPr txBox="1">
+            <a:spLocks noGrp="1"/>
+          </p:cNvSpPr>
+          <p:nvPr>
+            <p:ph type="sldNum" idx="12"/>
+          </p:nvPr>
+        </p:nvSpPr>
+        <p:spPr>
+          <a:prstGeom prst="rect">
+            <a:avLst/>
+          </a:prstGeom>
+          <a:noFill/>
+          <a:ln>
+            <a:noFill/>
+          </a:ln>
+        </p:spPr>
+        <p:txBody>
+          <a:bodyPr spcFirstLastPara="1" wrap="square" lIns="91425" tIns="91425" rIns="91425" bIns="91425" anchor="ctr" anchorCtr="0">
+            <a:noAutofit/>
+          </a:bodyPr>
+          <a:lstStyle/>
+          <a:p>
+            <a:pPr marL="0" lvl="0" indent="0" algn="r" rtl="0">
+              <a:spcBef>
+                <a:spcPts val="0"/>
+              </a:spcBef>
+              <a:spcAft>
+                <a:spcPts val="0"/>
+              </a:spcAft>
+              <a:buClr>
+                <a:srgbClr val="000000"/>
+              </a:buClr>
+              <a:buSzPts val="1000"/>
+              <a:buFont typeface="Arial"/>
+              <a:buNone/>
+            </a:pPr>
+            <a:fld id="{00000000-1234-1234-1234-123412341234}" type="slidenum">
+              <a:rPr lang="en-US"/>
+              <a:t>17</a:t>
+            </a:fld>
+            <a:endParaRPr/>
+          </a:p>
+        </p:txBody>
+      </p:sp>
+    </p:spTree>
+  </p:cSld>
+  <p:clrMapOvr>
+    <a:masterClrMapping/>
+  </p:clrMapOvr>
+</p:sld>
+</file>
+
+<file path=ppt/slides/slide18.xml><?xml version="1.0" encoding="utf-8"?>
 <p:sld xmlns:a="http://schemas.openxmlformats.org/drawingml/2006/main" xmlns:r="http://schemas.openxmlformats.org/officeDocument/2006/relationships" xmlns:p="http://schemas.openxmlformats.org/presentationml/2006/main">
   <p:cSld>
     <p:spTree>
@@ -15670,10 +16073,6 @@
           </p:nvPr>
         </p:nvSpPr>
         <p:spPr>
-          <a:xfrm>
-            <a:off x="311700" y="445025"/>
-            <a:ext cx="8520600" cy="572700"/>
-          </a:xfrm>
           <a:prstGeom prst="rect">
             <a:avLst/>
           </a:prstGeom>
@@ -15712,155 +16111,6 @@
       </p:sp>
       <p:sp>
         <p:nvSpPr>
-          <p:cNvPr id="551" name="Google Shape;551;p44"/>
-          <p:cNvSpPr txBox="1">
-            <a:spLocks noGrp="1"/>
-          </p:cNvSpPr>
-          <p:nvPr>
-            <p:ph type="body" idx="1"/>
-          </p:nvPr>
-        </p:nvSpPr>
-        <p:spPr>
-          <a:xfrm>
-            <a:off x="311700" y="1152475"/>
-            <a:ext cx="8520600" cy="3416400"/>
-          </a:xfrm>
-          <a:prstGeom prst="rect">
-            <a:avLst/>
-          </a:prstGeom>
-          <a:noFill/>
-          <a:ln>
-            <a:noFill/>
-          </a:ln>
-        </p:spPr>
-        <p:txBody>
-          <a:bodyPr spcFirstLastPara="1" wrap="square" lIns="91425" tIns="91425" rIns="91425" bIns="91425" anchor="t" anchorCtr="0">
-            <a:noAutofit/>
-          </a:bodyPr>
-          <a:lstStyle/>
-          <a:p>
-            <a:pPr marL="457200" lvl="0" indent="-342900" algn="l" rtl="0">
-              <a:lnSpc>
-                <a:spcPct val="115000"/>
-              </a:lnSpc>
-              <a:spcBef>
-                <a:spcPts val="0"/>
-              </a:spcBef>
-              <a:spcAft>
-                <a:spcPts val="0"/>
-              </a:spcAft>
-              <a:buClr>
-                <a:srgbClr val="000000"/>
-              </a:buClr>
-              <a:buSzPts val="1800"/>
-              <a:buFont typeface="Cabin"/>
-              <a:buChar char="●"/>
-            </a:pPr>
-            <a:r>
-              <a:rPr lang="en-US" dirty="0"/>
-              <a:t>API’s are just a contract – something business-oriented folk can and should understand well!</a:t>
-            </a:r>
-            <a:endParaRPr dirty="0"/>
-          </a:p>
-          <a:p>
-            <a:pPr marL="457200" lvl="0" indent="-228600" algn="l" rtl="0">
-              <a:lnSpc>
-                <a:spcPct val="115000"/>
-              </a:lnSpc>
-              <a:spcBef>
-                <a:spcPts val="0"/>
-              </a:spcBef>
-              <a:spcAft>
-                <a:spcPts val="0"/>
-              </a:spcAft>
-              <a:buClr>
-                <a:srgbClr val="000000"/>
-              </a:buClr>
-              <a:buSzPts val="1800"/>
-              <a:buFont typeface="Cabin"/>
-              <a:buNone/>
-            </a:pPr>
-            <a:endParaRPr dirty="0"/>
-          </a:p>
-          <a:p>
-            <a:pPr marL="457200" lvl="0" indent="-342900" algn="l" rtl="0">
-              <a:lnSpc>
-                <a:spcPct val="115000"/>
-              </a:lnSpc>
-              <a:spcBef>
-                <a:spcPts val="0"/>
-              </a:spcBef>
-              <a:spcAft>
-                <a:spcPts val="0"/>
-              </a:spcAft>
-              <a:buClr>
-                <a:srgbClr val="000000"/>
-              </a:buClr>
-              <a:buSzPts val="1800"/>
-              <a:buFont typeface="Cabin"/>
-              <a:buChar char="●"/>
-            </a:pPr>
-            <a:r>
-              <a:rPr lang="en-US" dirty="0"/>
-              <a:t>There are standard parameters for these contracts that make defining them easier.</a:t>
-            </a:r>
-            <a:endParaRPr dirty="0"/>
-          </a:p>
-          <a:p>
-            <a:pPr marL="457200" lvl="0" indent="0" algn="l" rtl="0">
-              <a:lnSpc>
-                <a:spcPct val="115000"/>
-              </a:lnSpc>
-              <a:spcBef>
-                <a:spcPts val="0"/>
-              </a:spcBef>
-              <a:spcAft>
-                <a:spcPts val="0"/>
-              </a:spcAft>
-              <a:buNone/>
-            </a:pPr>
-            <a:endParaRPr dirty="0"/>
-          </a:p>
-          <a:p>
-            <a:pPr marL="457200" lvl="0" indent="-342900" algn="l" rtl="0">
-              <a:lnSpc>
-                <a:spcPct val="115000"/>
-              </a:lnSpc>
-              <a:spcBef>
-                <a:spcPts val="0"/>
-              </a:spcBef>
-              <a:spcAft>
-                <a:spcPts val="0"/>
-              </a:spcAft>
-              <a:buSzPts val="1800"/>
-              <a:buChar char="●"/>
-            </a:pPr>
-            <a:r>
-              <a:rPr lang="en-US" dirty="0"/>
-              <a:t> There are programmatic tools (ex: Python) that make working with API’s possible and, dare I even say, easy?</a:t>
-            </a:r>
-            <a:endParaRPr dirty="0"/>
-          </a:p>
-          <a:p>
-            <a:pPr marL="114300" lvl="0" indent="0" algn="l" rtl="0">
-              <a:lnSpc>
-                <a:spcPct val="115000"/>
-              </a:lnSpc>
-              <a:spcBef>
-                <a:spcPts val="0"/>
-              </a:spcBef>
-              <a:spcAft>
-                <a:spcPts val="0"/>
-              </a:spcAft>
-              <a:buSzPts val="1800"/>
-              <a:buNone/>
-            </a:pPr>
-            <a:endParaRPr dirty="0"/>
-          </a:p>
-        </p:txBody>
-      </p:sp>
-      <p:sp>
-        <p:nvSpPr>
           <p:cNvPr id="552" name="Google Shape;552;p44"/>
           <p:cNvSpPr txBox="1">
             <a:spLocks noGrp="1"/>
@@ -15870,10 +16120,6 @@
           </p:nvPr>
         </p:nvSpPr>
         <p:spPr>
-          <a:xfrm>
-            <a:off x="8595308" y="4825067"/>
-            <a:ext cx="548700" cy="393600"/>
-          </a:xfrm>
           <a:prstGeom prst="rect">
             <a:avLst/>
           </a:prstGeom>
@@ -15904,13 +16150,398 @@
             </a:pPr>
             <a:fld id="{00000000-1234-1234-1234-123412341234}" type="slidenum">
               <a:rPr lang="en-US"/>
-              <a:t>17</a:t>
+              <a:t>18</a:t>
             </a:fld>
             <a:endParaRPr/>
           </a:p>
         </p:txBody>
       </p:sp>
+      <p:sp>
+        <p:nvSpPr>
+          <p:cNvPr id="7" name="Oval 6">
+            <a:extLst>
+              <a:ext uri="{FF2B5EF4-FFF2-40B4-BE49-F238E27FC236}">
+                <a16:creationId xmlns:a16="http://schemas.microsoft.com/office/drawing/2014/main" id="{AD9A5474-0973-B342-ADDF-5F841766F7AC}"/>
+              </a:ext>
+            </a:extLst>
+          </p:cNvPr>
+          <p:cNvSpPr/>
+          <p:nvPr/>
+        </p:nvSpPr>
+        <p:spPr>
+          <a:xfrm>
+            <a:off x="618290" y="1576923"/>
+            <a:ext cx="1828959" cy="1828959"/>
+          </a:xfrm>
+          <a:prstGeom prst="ellipse">
+            <a:avLst/>
+          </a:prstGeom>
+          <a:solidFill>
+            <a:schemeClr val="accent3"/>
+          </a:solidFill>
+          <a:ln>
+            <a:noFill/>
+          </a:ln>
+        </p:spPr>
+        <p:style>
+          <a:lnRef idx="0">
+            <a:scrgbClr r="0" g="0" b="0"/>
+          </a:lnRef>
+          <a:fillRef idx="0">
+            <a:scrgbClr r="0" g="0" b="0"/>
+          </a:fillRef>
+          <a:effectRef idx="0">
+            <a:scrgbClr r="0" g="0" b="0"/>
+          </a:effectRef>
+          <a:fontRef idx="minor">
+            <a:schemeClr val="lt1"/>
+          </a:fontRef>
+        </p:style>
+        <p:txBody>
+          <a:bodyPr rot="0" spcFirstLastPara="0" vertOverflow="overflow" horzOverflow="overflow" vert="horz" wrap="square" lIns="91440" tIns="45720" rIns="91440" bIns="45720" numCol="1" spcCol="0" rtlCol="0" fromWordArt="0" anchor="ctr" anchorCtr="0" forceAA="0" compatLnSpc="1">
+            <a:prstTxWarp prst="textNoShape">
+              <a:avLst/>
+            </a:prstTxWarp>
+            <a:noAutofit/>
+          </a:bodyPr>
+          <a:lstStyle/>
+          <a:p>
+            <a:pPr algn="ctr"/>
+            <a:endParaRPr lang="en-US" dirty="0"/>
+          </a:p>
+        </p:txBody>
+      </p:sp>
+      <p:sp>
+        <p:nvSpPr>
+          <p:cNvPr id="4" name="TextBox 3">
+            <a:extLst>
+              <a:ext uri="{FF2B5EF4-FFF2-40B4-BE49-F238E27FC236}">
+                <a16:creationId xmlns:a16="http://schemas.microsoft.com/office/drawing/2014/main" id="{3F612D8C-7A3E-C642-AD5C-29F066F4C92A}"/>
+              </a:ext>
+            </a:extLst>
+          </p:cNvPr>
+          <p:cNvSpPr txBox="1"/>
+          <p:nvPr/>
+        </p:nvSpPr>
+        <p:spPr>
+          <a:xfrm>
+            <a:off x="461249" y="3592621"/>
+            <a:ext cx="2143040" cy="523220"/>
+          </a:xfrm>
+          <a:prstGeom prst="rect">
+            <a:avLst/>
+          </a:prstGeom>
+          <a:noFill/>
+        </p:spPr>
+        <p:txBody>
+          <a:bodyPr wrap="square" rtlCol="0">
+            <a:spAutoFit/>
+          </a:bodyPr>
+          <a:lstStyle/>
+          <a:p>
+            <a:pPr algn="ctr"/>
+            <a:r>
+              <a:rPr lang="en-US" dirty="0"/>
+              <a:t>API’s are just contracts at heart – not too scary!</a:t>
+            </a:r>
+          </a:p>
+        </p:txBody>
+      </p:sp>
+      <p:sp>
+        <p:nvSpPr>
+          <p:cNvPr id="10" name="Oval 9">
+            <a:extLst>
+              <a:ext uri="{FF2B5EF4-FFF2-40B4-BE49-F238E27FC236}">
+                <a16:creationId xmlns:a16="http://schemas.microsoft.com/office/drawing/2014/main" id="{78C73098-432E-B94E-8495-9B9FBD52AE5E}"/>
+              </a:ext>
+            </a:extLst>
+          </p:cNvPr>
+          <p:cNvSpPr/>
+          <p:nvPr/>
+        </p:nvSpPr>
+        <p:spPr>
+          <a:xfrm>
+            <a:off x="3801566" y="1576923"/>
+            <a:ext cx="1828959" cy="1828959"/>
+          </a:xfrm>
+          <a:prstGeom prst="ellipse">
+            <a:avLst/>
+          </a:prstGeom>
+          <a:solidFill>
+            <a:schemeClr val="accent3"/>
+          </a:solidFill>
+          <a:ln>
+            <a:noFill/>
+          </a:ln>
+        </p:spPr>
+        <p:style>
+          <a:lnRef idx="0">
+            <a:scrgbClr r="0" g="0" b="0"/>
+          </a:lnRef>
+          <a:fillRef idx="0">
+            <a:scrgbClr r="0" g="0" b="0"/>
+          </a:fillRef>
+          <a:effectRef idx="0">
+            <a:scrgbClr r="0" g="0" b="0"/>
+          </a:effectRef>
+          <a:fontRef idx="minor">
+            <a:schemeClr val="lt1"/>
+          </a:fontRef>
+        </p:style>
+        <p:txBody>
+          <a:bodyPr rot="0" spcFirstLastPara="0" vertOverflow="overflow" horzOverflow="overflow" vert="horz" wrap="square" lIns="91440" tIns="45720" rIns="91440" bIns="45720" numCol="1" spcCol="0" rtlCol="0" fromWordArt="0" anchor="ctr" anchorCtr="0" forceAA="0" compatLnSpc="1">
+            <a:prstTxWarp prst="textNoShape">
+              <a:avLst/>
+            </a:prstTxWarp>
+            <a:noAutofit/>
+          </a:bodyPr>
+          <a:lstStyle/>
+          <a:p>
+            <a:pPr algn="ctr"/>
+            <a:endParaRPr lang="en-US" dirty="0"/>
+          </a:p>
+        </p:txBody>
+      </p:sp>
+      <p:sp>
+        <p:nvSpPr>
+          <p:cNvPr id="11" name="TextBox 10">
+            <a:extLst>
+              <a:ext uri="{FF2B5EF4-FFF2-40B4-BE49-F238E27FC236}">
+                <a16:creationId xmlns:a16="http://schemas.microsoft.com/office/drawing/2014/main" id="{770B7963-F063-604A-B333-8E33324EAC3B}"/>
+              </a:ext>
+            </a:extLst>
+          </p:cNvPr>
+          <p:cNvSpPr txBox="1"/>
+          <p:nvPr/>
+        </p:nvSpPr>
+        <p:spPr>
+          <a:xfrm>
+            <a:off x="3644525" y="3625329"/>
+            <a:ext cx="2143040" cy="738664"/>
+          </a:xfrm>
+          <a:prstGeom prst="rect">
+            <a:avLst/>
+          </a:prstGeom>
+          <a:noFill/>
+        </p:spPr>
+        <p:txBody>
+          <a:bodyPr wrap="square" rtlCol="0">
+            <a:spAutoFit/>
+          </a:bodyPr>
+          <a:lstStyle/>
+          <a:p>
+            <a:pPr algn="ctr"/>
+            <a:r>
+              <a:rPr lang="en-US" dirty="0"/>
+              <a:t>Standard parameters make API definitions simpler</a:t>
+            </a:r>
+          </a:p>
+        </p:txBody>
+      </p:sp>
+      <p:pic>
+        <p:nvPicPr>
+          <p:cNvPr id="14" name="Graphic 13">
+            <a:extLst>
+              <a:ext uri="{FF2B5EF4-FFF2-40B4-BE49-F238E27FC236}">
+                <a16:creationId xmlns:a16="http://schemas.microsoft.com/office/drawing/2014/main" id="{F9B78606-8432-C24B-87CF-3CAA7A8F5A53}"/>
+              </a:ext>
+            </a:extLst>
+          </p:cNvPr>
+          <p:cNvPicPr>
+            <a:picLocks noChangeAspect="1"/>
+          </p:cNvPicPr>
+          <p:nvPr/>
+        </p:nvPicPr>
+        <p:blipFill>
+          <a:blip r:embed="rId3">
+            <a:extLst>
+              <a:ext uri="{96DAC541-7B7A-43D3-8B79-37D633B846F1}">
+                <asvg:svgBlip xmlns:asvg="http://schemas.microsoft.com/office/drawing/2016/SVG/main" r:embed="rId4"/>
+              </a:ext>
+            </a:extLst>
+          </a:blip>
+          <a:stretch>
+            <a:fillRect/>
+          </a:stretch>
+        </p:blipFill>
+        <p:spPr>
+          <a:xfrm>
+            <a:off x="4261951" y="1921185"/>
+            <a:ext cx="908188" cy="1102800"/>
+          </a:xfrm>
+          <a:prstGeom prst="rect">
+            <a:avLst/>
+          </a:prstGeom>
+        </p:spPr>
+      </p:pic>
+      <p:pic>
+        <p:nvPicPr>
+          <p:cNvPr id="12" name="Graphic 11" descr="Contract outline">
+            <a:extLst>
+              <a:ext uri="{FF2B5EF4-FFF2-40B4-BE49-F238E27FC236}">
+                <a16:creationId xmlns:a16="http://schemas.microsoft.com/office/drawing/2014/main" id="{1C58EF24-EAF4-1C4D-BB56-F80394464705}"/>
+              </a:ext>
+            </a:extLst>
+          </p:cNvPr>
+          <p:cNvPicPr>
+            <a:picLocks noChangeAspect="1"/>
+          </p:cNvPicPr>
+          <p:nvPr/>
+        </p:nvPicPr>
+        <p:blipFill>
+          <a:blip r:embed="rId5">
+            <a:extLst>
+              <a:ext uri="{96DAC541-7B7A-43D3-8B79-37D633B846F1}">
+                <asvg:svgBlip xmlns:asvg="http://schemas.microsoft.com/office/drawing/2016/SVG/main" r:embed="rId6"/>
+              </a:ext>
+            </a:extLst>
+          </a:blip>
+          <a:stretch>
+            <a:fillRect/>
+          </a:stretch>
+        </p:blipFill>
+        <p:spPr>
+          <a:xfrm>
+            <a:off x="962553" y="1888477"/>
+            <a:ext cx="1129922" cy="1129922"/>
+          </a:xfrm>
+          <a:prstGeom prst="rect">
+            <a:avLst/>
+          </a:prstGeom>
+        </p:spPr>
+      </p:pic>
+      <p:sp>
+        <p:nvSpPr>
+          <p:cNvPr id="17" name="Oval 16">
+            <a:extLst>
+              <a:ext uri="{FF2B5EF4-FFF2-40B4-BE49-F238E27FC236}">
+                <a16:creationId xmlns:a16="http://schemas.microsoft.com/office/drawing/2014/main" id="{565AB56F-6D98-D046-995B-AD1CC81C48C1}"/>
+              </a:ext>
+            </a:extLst>
+          </p:cNvPr>
+          <p:cNvSpPr/>
+          <p:nvPr/>
+        </p:nvSpPr>
+        <p:spPr>
+          <a:xfrm>
+            <a:off x="6827801" y="1527861"/>
+            <a:ext cx="1828959" cy="1828959"/>
+          </a:xfrm>
+          <a:prstGeom prst="ellipse">
+            <a:avLst/>
+          </a:prstGeom>
+          <a:solidFill>
+            <a:schemeClr val="accent3"/>
+          </a:solidFill>
+          <a:ln>
+            <a:noFill/>
+          </a:ln>
+        </p:spPr>
+        <p:style>
+          <a:lnRef idx="0">
+            <a:scrgbClr r="0" g="0" b="0"/>
+          </a:lnRef>
+          <a:fillRef idx="0">
+            <a:scrgbClr r="0" g="0" b="0"/>
+          </a:fillRef>
+          <a:effectRef idx="0">
+            <a:scrgbClr r="0" g="0" b="0"/>
+          </a:effectRef>
+          <a:fontRef idx="minor">
+            <a:schemeClr val="lt1"/>
+          </a:fontRef>
+        </p:style>
+        <p:txBody>
+          <a:bodyPr rot="0" spcFirstLastPara="0" vertOverflow="overflow" horzOverflow="overflow" vert="horz" wrap="square" lIns="91440" tIns="45720" rIns="91440" bIns="45720" numCol="1" spcCol="0" rtlCol="0" fromWordArt="0" anchor="ctr" anchorCtr="0" forceAA="0" compatLnSpc="1">
+            <a:prstTxWarp prst="textNoShape">
+              <a:avLst/>
+            </a:prstTxWarp>
+            <a:noAutofit/>
+          </a:bodyPr>
+          <a:lstStyle/>
+          <a:p>
+            <a:pPr algn="ctr"/>
+            <a:endParaRPr lang="en-US" dirty="0"/>
+          </a:p>
+        </p:txBody>
+      </p:sp>
+      <p:sp>
+        <p:nvSpPr>
+          <p:cNvPr id="18" name="TextBox 17">
+            <a:extLst>
+              <a:ext uri="{FF2B5EF4-FFF2-40B4-BE49-F238E27FC236}">
+                <a16:creationId xmlns:a16="http://schemas.microsoft.com/office/drawing/2014/main" id="{7ADC398B-4B83-6247-A132-72BE7DC6CB4B}"/>
+              </a:ext>
+            </a:extLst>
+          </p:cNvPr>
+          <p:cNvSpPr txBox="1"/>
+          <p:nvPr/>
+        </p:nvSpPr>
+        <p:spPr>
+          <a:xfrm>
+            <a:off x="6670760" y="3576267"/>
+            <a:ext cx="2143040" cy="954107"/>
+          </a:xfrm>
+          <a:prstGeom prst="rect">
+            <a:avLst/>
+          </a:prstGeom>
+          <a:noFill/>
+        </p:spPr>
+        <p:txBody>
+          <a:bodyPr wrap="square" rtlCol="0">
+            <a:spAutoFit/>
+          </a:bodyPr>
+          <a:lstStyle/>
+          <a:p>
+            <a:pPr algn="ctr"/>
+            <a:r>
+              <a:rPr lang="en-US" dirty="0"/>
+              <a:t>Programmatic tools can streamline definition/consumption of API’s further</a:t>
+            </a:r>
+          </a:p>
+        </p:txBody>
+      </p:sp>
+      <p:pic>
+        <p:nvPicPr>
+          <p:cNvPr id="20" name="Graphic 19">
+            <a:extLst>
+              <a:ext uri="{FF2B5EF4-FFF2-40B4-BE49-F238E27FC236}">
+                <a16:creationId xmlns:a16="http://schemas.microsoft.com/office/drawing/2014/main" id="{61C590BB-9641-7344-8DB7-A2A631CC1009}"/>
+              </a:ext>
+            </a:extLst>
+          </p:cNvPr>
+          <p:cNvPicPr>
+            <a:picLocks noChangeAspect="1"/>
+          </p:cNvPicPr>
+          <p:nvPr/>
+        </p:nvPicPr>
+        <p:blipFill>
+          <a:blip r:embed="rId7">
+            <a:extLst>
+              <a:ext uri="{96DAC541-7B7A-43D3-8B79-37D633B846F1}">
+                <asvg:svgBlip xmlns:asvg="http://schemas.microsoft.com/office/drawing/2016/SVG/main" r:embed="rId8"/>
+              </a:ext>
+            </a:extLst>
+          </a:blip>
+          <a:srcRect/>
+          <a:stretch/>
+        </p:blipFill>
+        <p:spPr>
+          <a:xfrm>
+            <a:off x="7264806" y="1964866"/>
+            <a:ext cx="954947" cy="954947"/>
+          </a:xfrm>
+          <a:prstGeom prst="rect">
+            <a:avLst/>
+          </a:prstGeom>
+        </p:spPr>
+      </p:pic>
     </p:spTree>
+    <p:extLst>
+      <p:ext uri="{BB962C8B-B14F-4D97-AF65-F5344CB8AC3E}">
+        <p14:creationId xmlns:p14="http://schemas.microsoft.com/office/powerpoint/2010/main" val="2528901454"/>
+      </p:ext>
+    </p:extLst>
   </p:cSld>
   <p:clrMapOvr>
     <a:masterClrMapping/>
@@ -15918,9 +16549,17 @@
 </p:sld>
 </file>
 
-<file path=ppt/slides/slide18.xml><?xml version="1.0" encoding="utf-8"?>
+<file path=ppt/slides/slide19.xml><?xml version="1.0" encoding="utf-8"?>
 <p:sld xmlns:a="http://schemas.openxmlformats.org/drawingml/2006/main" xmlns:r="http://schemas.openxmlformats.org/officeDocument/2006/relationships" xmlns:p="http://schemas.openxmlformats.org/presentationml/2006/main">
   <p:cSld>
+    <p:bg>
+      <p:bgPr>
+        <a:solidFill>
+          <a:schemeClr val="lt1"/>
+        </a:solidFill>
+        <a:effectLst/>
+      </p:bgPr>
+    </p:bg>
     <p:spTree>
       <p:nvGrpSpPr>
         <p:cNvPr id="1" name="Shape 563"/>
@@ -15946,10 +16585,6 @@
           </p:nvPr>
         </p:nvSpPr>
         <p:spPr>
-          <a:xfrm>
-            <a:off x="311700" y="2150850"/>
-            <a:ext cx="8520600" cy="841800"/>
-          </a:xfrm>
           <a:prstGeom prst="rect">
             <a:avLst/>
           </a:prstGeom>
@@ -15997,137 +16632,6 @@
           </p:nvPr>
         </p:nvSpPr>
         <p:spPr>
-          <a:xfrm>
-            <a:off x="8595308" y="4825067"/>
-            <a:ext cx="548700" cy="393600"/>
-          </a:xfrm>
-          <a:prstGeom prst="rect">
-            <a:avLst/>
-          </a:prstGeom>
-          <a:noFill/>
-          <a:ln>
-            <a:noFill/>
-          </a:ln>
-        </p:spPr>
-        <p:txBody>
-          <a:bodyPr spcFirstLastPara="1" wrap="square" lIns="91425" tIns="91425" rIns="91425" bIns="91425" anchor="ctr" anchorCtr="0">
-            <a:noAutofit/>
-          </a:bodyPr>
-          <a:lstStyle/>
-          <a:p>
-            <a:pPr marL="0" lvl="0" indent="0" algn="r" rtl="0">
-              <a:spcBef>
-                <a:spcPts val="0"/>
-              </a:spcBef>
-              <a:spcAft>
-                <a:spcPts val="0"/>
-              </a:spcAft>
-              <a:buClr>
-                <a:srgbClr val="000000"/>
-              </a:buClr>
-              <a:buSzPts val="1000"/>
-              <a:buFont typeface="Arial"/>
-              <a:buNone/>
-            </a:pPr>
-            <a:fld id="{00000000-1234-1234-1234-123412341234}" type="slidenum">
-              <a:rPr lang="en-US"/>
-              <a:t>18</a:t>
-            </a:fld>
-            <a:endParaRPr/>
-          </a:p>
-        </p:txBody>
-      </p:sp>
-    </p:spTree>
-  </p:cSld>
-  <p:clrMapOvr>
-    <a:masterClrMapping/>
-  </p:clrMapOvr>
-</p:sld>
-</file>
-
-<file path=ppt/slides/slide19.xml><?xml version="1.0" encoding="utf-8"?>
-<p:sld xmlns:a="http://schemas.openxmlformats.org/drawingml/2006/main" xmlns:r="http://schemas.openxmlformats.org/officeDocument/2006/relationships" xmlns:p="http://schemas.openxmlformats.org/presentationml/2006/main">
-  <p:cSld>
-    <p:spTree>
-      <p:nvGrpSpPr>
-        <p:cNvPr id="1" name="Shape 569"/>
-        <p:cNvGrpSpPr/>
-        <p:nvPr/>
-      </p:nvGrpSpPr>
-      <p:grpSpPr>
-        <a:xfrm>
-          <a:off x="0" y="0"/>
-          <a:ext cx="0" cy="0"/>
-          <a:chOff x="0" y="0"/>
-          <a:chExt cx="0" cy="0"/>
-        </a:xfrm>
-      </p:grpSpPr>
-      <p:sp>
-        <p:nvSpPr>
-          <p:cNvPr id="570" name="Google Shape;570;p47"/>
-          <p:cNvSpPr txBox="1">
-            <a:spLocks noGrp="1"/>
-          </p:cNvSpPr>
-          <p:nvPr>
-            <p:ph type="title"/>
-          </p:nvPr>
-        </p:nvSpPr>
-        <p:spPr>
-          <a:xfrm>
-            <a:off x="311700" y="2150850"/>
-            <a:ext cx="8520600" cy="841800"/>
-          </a:xfrm>
-          <a:prstGeom prst="rect">
-            <a:avLst/>
-          </a:prstGeom>
-          <a:noFill/>
-          <a:ln>
-            <a:noFill/>
-          </a:ln>
-        </p:spPr>
-        <p:txBody>
-          <a:bodyPr spcFirstLastPara="1" wrap="square" lIns="91425" tIns="91425" rIns="91425" bIns="91425" anchor="ctr" anchorCtr="0">
-            <a:noAutofit/>
-          </a:bodyPr>
-          <a:lstStyle/>
-          <a:p>
-            <a:pPr marL="0" lvl="0" indent="0" algn="ctr" rtl="0">
-              <a:lnSpc>
-                <a:spcPct val="100000"/>
-              </a:lnSpc>
-              <a:spcBef>
-                <a:spcPts val="0"/>
-              </a:spcBef>
-              <a:spcAft>
-                <a:spcPts val="0"/>
-              </a:spcAft>
-              <a:buSzPts val="3600"/>
-              <a:buFont typeface="Shadows Into Light"/>
-              <a:buNone/>
-            </a:pPr>
-            <a:r>
-              <a:rPr lang="en-US"/>
-              <a:t>Thank you!</a:t>
-            </a:r>
-            <a:endParaRPr/>
-          </a:p>
-        </p:txBody>
-      </p:sp>
-      <p:sp>
-        <p:nvSpPr>
-          <p:cNvPr id="571" name="Google Shape;571;p47"/>
-          <p:cNvSpPr txBox="1">
-            <a:spLocks noGrp="1"/>
-          </p:cNvSpPr>
-          <p:nvPr>
-            <p:ph type="sldNum" idx="12"/>
-          </p:nvPr>
-        </p:nvSpPr>
-        <p:spPr>
-          <a:xfrm>
-            <a:off x="8595308" y="4825067"/>
-            <a:ext cx="548700" cy="393600"/>
-          </a:xfrm>
           <a:prstGeom prst="rect">
             <a:avLst/>
           </a:prstGeom>
@@ -16200,10 +16704,6 @@
           </p:nvPr>
         </p:nvSpPr>
         <p:spPr>
-          <a:xfrm>
-            <a:off x="311700" y="445025"/>
-            <a:ext cx="8520600" cy="572700"/>
-          </a:xfrm>
           <a:prstGeom prst="rect">
             <a:avLst/>
           </a:prstGeom>
@@ -16251,10 +16751,6 @@
           </p:nvPr>
         </p:nvSpPr>
         <p:spPr>
-          <a:xfrm>
-            <a:off x="311700" y="1152475"/>
-            <a:ext cx="8520600" cy="3416400"/>
-          </a:xfrm>
           <a:prstGeom prst="rect">
             <a:avLst/>
           </a:prstGeom>
@@ -16277,13 +16773,13 @@
           <a:p>
             <a:r>
               <a:rPr lang="en-US" sz="1800" dirty="0"/>
-              <a:t>If I’m not an engineer, why do I care about API’s?</a:t>
+              <a:t>I’m not an engineer, why do I care?</a:t>
             </a:r>
           </a:p>
           <a:p>
             <a:r>
               <a:rPr lang="en-US" dirty="0"/>
-              <a:t>A real world example of API’s in action!</a:t>
+              <a:t>Real world example of API’s in action!</a:t>
             </a:r>
           </a:p>
           <a:p>
@@ -16326,10 +16822,6 @@
           </p:nvPr>
         </p:nvSpPr>
         <p:spPr>
-          <a:xfrm>
-            <a:off x="8595308" y="4825067"/>
-            <a:ext cx="548700" cy="393600"/>
-          </a:xfrm>
           <a:prstGeom prst="rect">
             <a:avLst/>
           </a:prstGeom>
@@ -16361,6 +16853,125 @@
             <a:fld id="{00000000-1234-1234-1234-123412341234}" type="slidenum">
               <a:rPr lang="en-US"/>
               <a:t>2</a:t>
+            </a:fld>
+            <a:endParaRPr/>
+          </a:p>
+        </p:txBody>
+      </p:sp>
+    </p:spTree>
+  </p:cSld>
+  <p:clrMapOvr>
+    <a:masterClrMapping/>
+  </p:clrMapOvr>
+</p:sld>
+</file>
+
+<file path=ppt/slides/slide20.xml><?xml version="1.0" encoding="utf-8"?>
+<p:sld xmlns:a="http://schemas.openxmlformats.org/drawingml/2006/main" xmlns:r="http://schemas.openxmlformats.org/officeDocument/2006/relationships" xmlns:p="http://schemas.openxmlformats.org/presentationml/2006/main">
+  <p:cSld>
+    <p:spTree>
+      <p:nvGrpSpPr>
+        <p:cNvPr id="1" name="Shape 569"/>
+        <p:cNvGrpSpPr/>
+        <p:nvPr/>
+      </p:nvGrpSpPr>
+      <p:grpSpPr>
+        <a:xfrm>
+          <a:off x="0" y="0"/>
+          <a:ext cx="0" cy="0"/>
+          <a:chOff x="0" y="0"/>
+          <a:chExt cx="0" cy="0"/>
+        </a:xfrm>
+      </p:grpSpPr>
+      <p:sp>
+        <p:nvSpPr>
+          <p:cNvPr id="570" name="Google Shape;570;p47"/>
+          <p:cNvSpPr txBox="1">
+            <a:spLocks noGrp="1"/>
+          </p:cNvSpPr>
+          <p:nvPr>
+            <p:ph type="title"/>
+          </p:nvPr>
+        </p:nvSpPr>
+        <p:spPr>
+          <a:prstGeom prst="rect">
+            <a:avLst/>
+          </a:prstGeom>
+          <a:noFill/>
+          <a:ln>
+            <a:noFill/>
+          </a:ln>
+        </p:spPr>
+        <p:txBody>
+          <a:bodyPr spcFirstLastPara="1" wrap="square" lIns="91425" tIns="91425" rIns="91425" bIns="91425" anchor="ctr" anchorCtr="0">
+            <a:noAutofit/>
+          </a:bodyPr>
+          <a:lstStyle/>
+          <a:p>
+            <a:pPr marL="0" lvl="0" indent="0" algn="ctr" rtl="0">
+              <a:lnSpc>
+                <a:spcPct val="100000"/>
+              </a:lnSpc>
+              <a:spcBef>
+                <a:spcPts val="0"/>
+              </a:spcBef>
+              <a:spcAft>
+                <a:spcPts val="0"/>
+              </a:spcAft>
+              <a:buSzPts val="3600"/>
+              <a:buFont typeface="Shadows Into Light"/>
+              <a:buNone/>
+            </a:pPr>
+            <a:r>
+              <a:rPr lang="en-US"/>
+              <a:t>Thank you!</a:t>
+            </a:r>
+            <a:endParaRPr/>
+          </a:p>
+        </p:txBody>
+      </p:sp>
+      <p:sp>
+        <p:nvSpPr>
+          <p:cNvPr id="571" name="Google Shape;571;p47"/>
+          <p:cNvSpPr txBox="1">
+            <a:spLocks noGrp="1"/>
+          </p:cNvSpPr>
+          <p:nvPr>
+            <p:ph type="sldNum" idx="12"/>
+          </p:nvPr>
+        </p:nvSpPr>
+        <p:spPr>
+          <a:prstGeom prst="rect">
+            <a:avLst/>
+          </a:prstGeom>
+          <a:noFill/>
+          <a:ln>
+            <a:noFill/>
+          </a:ln>
+        </p:spPr>
+        <p:txBody>
+          <a:bodyPr spcFirstLastPara="1" wrap="square" lIns="91425" tIns="91425" rIns="91425" bIns="91425" anchor="ctr" anchorCtr="0">
+            <a:noAutofit/>
+          </a:bodyPr>
+          <a:lstStyle/>
+          <a:p>
+            <a:pPr marL="0" lvl="0" indent="0" algn="r" rtl="0">
+              <a:spcBef>
+                <a:spcPts val="0"/>
+              </a:spcBef>
+              <a:spcAft>
+                <a:spcPts val="0"/>
+              </a:spcAft>
+              <a:buClr>
+                <a:srgbClr val="000000"/>
+              </a:buClr>
+              <a:buSzPts val="1000"/>
+              <a:buFont typeface="Arial"/>
+              <a:buNone/>
+            </a:pPr>
+            <a:fld id="{00000000-1234-1234-1234-123412341234}" type="slidenum">
+              <a:rPr lang="en-US"/>
+              <a:t>20</a:t>
             </a:fld>
             <a:endParaRPr/>
           </a:p>
@@ -16402,10 +17013,6 @@
           </p:nvPr>
         </p:nvSpPr>
         <p:spPr>
-          <a:xfrm>
-            <a:off x="311700" y="2150850"/>
-            <a:ext cx="8520600" cy="841800"/>
-          </a:xfrm>
           <a:prstGeom prst="rect">
             <a:avLst/>
           </a:prstGeom>
@@ -16453,10 +17060,6 @@
           </p:nvPr>
         </p:nvSpPr>
         <p:spPr>
-          <a:xfrm>
-            <a:off x="8595308" y="4825067"/>
-            <a:ext cx="548700" cy="393600"/>
-          </a:xfrm>
           <a:prstGeom prst="rect">
             <a:avLst/>
           </a:prstGeom>
@@ -16502,7 +17105,7 @@
 </file>
 
 <file path=ppt/slides/slide4.xml><?xml version="1.0" encoding="utf-8"?>
-<p:sld xmlns:a="http://schemas.openxmlformats.org/drawingml/2006/main" xmlns:r="http://schemas.openxmlformats.org/officeDocument/2006/relationships" xmlns:p="http://schemas.openxmlformats.org/presentationml/2006/main" show="0">
+<p:sld xmlns:a="http://schemas.openxmlformats.org/drawingml/2006/main" xmlns:r="http://schemas.openxmlformats.org/officeDocument/2006/relationships" xmlns:p="http://schemas.openxmlformats.org/presentationml/2006/main">
   <p:cSld>
     <p:spTree>
       <p:nvGrpSpPr>
@@ -16529,10 +17132,6 @@
           </p:nvPr>
         </p:nvSpPr>
         <p:spPr>
-          <a:xfrm>
-            <a:off x="311700" y="445025"/>
-            <a:ext cx="8520600" cy="572700"/>
-          </a:xfrm>
           <a:prstGeom prst="rect">
             <a:avLst/>
           </a:prstGeom>
@@ -16562,30 +17161,42 @@
               <a:buNone/>
             </a:pPr>
             <a:r>
-              <a:rPr lang="en-US" b="1" u="sng"/>
+              <a:rPr lang="en-US" b="1" u="sng" dirty="0">
+                <a:solidFill>
+                  <a:srgbClr val="FF0000"/>
+                </a:solidFill>
+              </a:rPr>
               <a:t>A</a:t>
             </a:r>
             <a:r>
-              <a:rPr lang="en-US"/>
+              <a:rPr lang="en-US" dirty="0"/>
               <a:t>pplication </a:t>
             </a:r>
             <a:r>
-              <a:rPr lang="en-US" b="1" u="sng"/>
+              <a:rPr lang="en-US" b="1" u="sng" dirty="0">
+                <a:solidFill>
+                  <a:srgbClr val="FF0000"/>
+                </a:solidFill>
+              </a:rPr>
               <a:t>P</a:t>
             </a:r>
             <a:r>
-              <a:rPr lang="en-US"/>
+              <a:rPr lang="en-US" dirty="0"/>
               <a:t>rogramming </a:t>
             </a:r>
             <a:r>
-              <a:rPr lang="en-US" b="1" u="sng"/>
+              <a:rPr lang="en-US" b="1" u="sng" dirty="0">
+                <a:solidFill>
+                  <a:srgbClr val="FF0000"/>
+                </a:solidFill>
+              </a:rPr>
               <a:t>I</a:t>
             </a:r>
             <a:r>
-              <a:rPr lang="en-US"/>
+              <a:rPr lang="en-US" dirty="0"/>
               <a:t>nterface</a:t>
             </a:r>
-            <a:endParaRPr/>
+            <a:endParaRPr dirty="0"/>
           </a:p>
         </p:txBody>
       </p:sp>
@@ -16600,10 +17211,6 @@
           </p:nvPr>
         </p:nvSpPr>
         <p:spPr>
-          <a:xfrm>
-            <a:off x="311700" y="1152475"/>
-            <a:ext cx="8520600" cy="3416400"/>
-          </a:xfrm>
           <a:prstGeom prst="rect">
             <a:avLst/>
           </a:prstGeom>
@@ -16632,10 +17239,10 @@
               <a:buNone/>
             </a:pPr>
             <a:r>
-              <a:rPr lang="en-US"/>
-              <a:t>A way for software entities to interact and exchange </a:t>
+              <a:rPr lang="en-US" dirty="0"/>
+              <a:t>A way for software entities to pass</a:t>
             </a:r>
-            <a:endParaRPr/>
+            <a:endParaRPr dirty="0"/>
           </a:p>
           <a:p>
             <a:pPr marL="114300" lvl="0" indent="0" algn="l" rtl="0">
@@ -16652,10 +17259,10 @@
               <a:buNone/>
             </a:pPr>
             <a:r>
-              <a:rPr lang="en-US"/>
-              <a:t>information according to a pre-agreed format </a:t>
+              <a:rPr lang="en-US" dirty="0"/>
+              <a:t>information according to a specific format </a:t>
             </a:r>
-            <a:endParaRPr/>
+            <a:endParaRPr dirty="0"/>
           </a:p>
         </p:txBody>
       </p:sp>
@@ -16670,10 +17277,6 @@
           </p:nvPr>
         </p:nvSpPr>
         <p:spPr>
-          <a:xfrm>
-            <a:off x="8595308" y="4825067"/>
-            <a:ext cx="548700" cy="393600"/>
-          </a:xfrm>
           <a:prstGeom prst="rect">
             <a:avLst/>
           </a:prstGeom>
@@ -16817,9 +17420,12 @@
                 <a:buNone/>
               </a:pPr>
               <a:r>
-                <a:rPr lang="en-US" sz="1200" b="0" i="0" u="none" strike="noStrike" cap="none">
+                <a:rPr lang="en-US" sz="1200" b="1" i="0" u="none" strike="noStrike" cap="none" dirty="0">
                   <a:solidFill>
-                    <a:schemeClr val="lt1"/>
+                    <a:schemeClr val="tx1">
+                      <a:lumMod val="85000"/>
+                      <a:lumOff val="15000"/>
+                    </a:schemeClr>
                   </a:solidFill>
                   <a:latin typeface="Arial"/>
                   <a:ea typeface="Arial"/>
@@ -16828,7 +17434,14 @@
                 </a:rPr>
                 <a:t>Sports Blog</a:t>
               </a:r>
-              <a:endParaRPr sz="1200"/>
+              <a:endParaRPr sz="1200" b="1" dirty="0">
+                <a:solidFill>
+                  <a:schemeClr val="tx1">
+                    <a:lumMod val="85000"/>
+                    <a:lumOff val="15000"/>
+                  </a:schemeClr>
+                </a:solidFill>
+              </a:endParaRPr>
             </a:p>
             <a:p>
               <a:pPr marL="0" marR="0" lvl="0" indent="0" algn="ctr" rtl="0">
@@ -16849,7 +17462,7 @@
                 <a:buNone/>
               </a:pPr>
               <a:r>
-                <a:rPr lang="en-US" sz="1200" b="0" i="0" u="none" strike="noStrike" cap="none">
+                <a:rPr lang="en-US" sz="1200" b="0" i="0" u="none" strike="noStrike" cap="none" dirty="0">
                   <a:solidFill>
                     <a:schemeClr val="lt1"/>
                   </a:solidFill>
@@ -16860,7 +17473,7 @@
                 </a:rPr>
                 <a:t>A table with latest NBA results</a:t>
               </a:r>
-              <a:endParaRPr sz="1200"/>
+              <a:endParaRPr sz="1200" dirty="0"/>
             </a:p>
           </p:txBody>
         </p:sp>
@@ -17056,9 +17669,12 @@
                 <a:buNone/>
               </a:pPr>
               <a:r>
-                <a:rPr lang="en-US" sz="1200" b="0" i="0" u="none" strike="noStrike" cap="none">
+                <a:rPr lang="en-US" sz="1200" b="1" i="0" u="none" strike="noStrike" cap="none" dirty="0">
                   <a:solidFill>
-                    <a:schemeClr val="lt1"/>
+                    <a:schemeClr val="tx1">
+                      <a:lumMod val="85000"/>
+                      <a:lumOff val="15000"/>
+                    </a:schemeClr>
                   </a:solidFill>
                   <a:latin typeface="Arial"/>
                   <a:ea typeface="Arial"/>
@@ -17067,9 +17683,12 @@
                 </a:rPr>
                 <a:t>ESPN Servers</a:t>
               </a:r>
-              <a:endParaRPr sz="900" b="0" i="0" u="none" strike="noStrike" cap="none">
+              <a:endParaRPr sz="900" b="1" i="0" u="none" strike="noStrike" cap="none" dirty="0">
                 <a:solidFill>
-                  <a:schemeClr val="lt1"/>
+                  <a:schemeClr val="tx1">
+                    <a:lumMod val="85000"/>
+                    <a:lumOff val="15000"/>
+                  </a:schemeClr>
                 </a:solidFill>
                 <a:latin typeface="Arial"/>
                 <a:ea typeface="Arial"/>
@@ -17286,9 +17905,12 @@
                 <a:buNone/>
               </a:pPr>
               <a:r>
-                <a:rPr lang="en-US" sz="1100" b="0" i="0" u="none" strike="noStrike" cap="none">
+                <a:rPr lang="en-US" sz="1200" b="1" i="0" u="none" strike="noStrike" cap="none" dirty="0">
                   <a:solidFill>
-                    <a:schemeClr val="lt1"/>
+                    <a:schemeClr val="tx1">
+                      <a:lumMod val="85000"/>
+                      <a:lumOff val="15000"/>
+                    </a:schemeClr>
                   </a:solidFill>
                   <a:latin typeface="Arial"/>
                   <a:ea typeface="Arial"/>
@@ -17297,7 +17919,14 @@
                 </a:rPr>
                 <a:t>Amazon Website</a:t>
               </a:r>
-              <a:endParaRPr sz="1100"/>
+              <a:endParaRPr sz="1200" b="1" dirty="0">
+                <a:solidFill>
+                  <a:schemeClr val="tx1">
+                    <a:lumMod val="85000"/>
+                    <a:lumOff val="15000"/>
+                  </a:schemeClr>
+                </a:solidFill>
+              </a:endParaRPr>
             </a:p>
             <a:p>
               <a:pPr marL="0" marR="0" lvl="0" indent="0" algn="ctr" rtl="0">
@@ -17318,7 +17947,7 @@
                 <a:buNone/>
               </a:pPr>
               <a:r>
-                <a:rPr lang="en-US" sz="1100" b="0" i="0" u="none" strike="noStrike" cap="none">
+                <a:rPr lang="en-US" sz="1000" b="0" i="0" u="none" strike="noStrike" cap="none" dirty="0">
                   <a:solidFill>
                     <a:schemeClr val="lt1"/>
                   </a:solidFill>
@@ -17329,7 +17958,7 @@
                 </a:rPr>
                 <a:t>Order “Cracking the PM interview” with credit card</a:t>
               </a:r>
-              <a:endParaRPr sz="1100"/>
+              <a:endParaRPr sz="1000" dirty="0"/>
             </a:p>
           </p:txBody>
         </p:sp>
@@ -17525,9 +18154,12 @@
                 <a:buNone/>
               </a:pPr>
               <a:r>
-                <a:rPr lang="en-US" sz="1100" b="0" i="0" u="none" strike="noStrike" cap="none">
+                <a:rPr lang="en-US" sz="1200" b="1" i="0" u="none" strike="noStrike" cap="none" dirty="0">
                   <a:solidFill>
-                    <a:schemeClr val="lt1"/>
+                    <a:schemeClr val="tx1">
+                      <a:lumMod val="85000"/>
+                      <a:lumOff val="15000"/>
+                    </a:schemeClr>
                   </a:solidFill>
                   <a:latin typeface="Arial"/>
                   <a:ea typeface="Arial"/>
@@ -17536,7 +18168,14 @@
                 </a:rPr>
                 <a:t>Credit Card Processing Solution</a:t>
               </a:r>
-              <a:endParaRPr/>
+              <a:endParaRPr sz="1600" b="1" dirty="0">
+                <a:solidFill>
+                  <a:schemeClr val="tx1">
+                    <a:lumMod val="85000"/>
+                    <a:lumOff val="15000"/>
+                  </a:schemeClr>
+                </a:solidFill>
+              </a:endParaRPr>
             </a:p>
             <a:p>
               <a:pPr marL="0" marR="0" lvl="0" indent="0" algn="ctr" rtl="0">
@@ -17557,7 +18196,7 @@
                 <a:buNone/>
               </a:pPr>
               <a:r>
-                <a:rPr lang="en-US" sz="900" b="0" i="0" u="none" strike="noStrike" cap="none">
+                <a:rPr lang="en-US" sz="1050" b="0" i="0" u="none" strike="noStrike" cap="none" dirty="0">
                   <a:solidFill>
                     <a:schemeClr val="lt1"/>
                   </a:solidFill>
@@ -17568,7 +18207,7 @@
                 </a:rPr>
                 <a:t>Charges credit card and returns status of transaction</a:t>
               </a:r>
-              <a:endParaRPr/>
+              <a:endParaRPr sz="1800" dirty="0"/>
             </a:p>
           </p:txBody>
         </p:sp>
@@ -17764,9 +18403,12 @@
                 <a:buNone/>
               </a:pPr>
               <a:r>
-                <a:rPr lang="en-US" sz="1000" b="0" i="0" u="none" strike="noStrike" cap="none">
+                <a:rPr lang="en-US" sz="1200" b="1" i="0" u="none" strike="noStrike" cap="none" dirty="0">
                   <a:solidFill>
-                    <a:schemeClr val="lt1"/>
+                    <a:schemeClr val="tx1">
+                      <a:lumMod val="85000"/>
+                      <a:lumOff val="15000"/>
+                    </a:schemeClr>
                   </a:solidFill>
                   <a:latin typeface="Arial"/>
                   <a:ea typeface="Arial"/>
@@ -17775,7 +18417,14 @@
                 </a:rPr>
                 <a:t>Amazon Servers</a:t>
               </a:r>
-              <a:endParaRPr sz="1000"/>
+              <a:endParaRPr sz="1200" b="1" dirty="0">
+                <a:solidFill>
+                  <a:schemeClr val="tx1">
+                    <a:lumMod val="85000"/>
+                    <a:lumOff val="15000"/>
+                  </a:schemeClr>
+                </a:solidFill>
+              </a:endParaRPr>
             </a:p>
             <a:p>
               <a:pPr marL="0" marR="0" lvl="0" indent="0" algn="ctr" rtl="0">
@@ -17796,7 +18445,7 @@
                 <a:buNone/>
               </a:pPr>
               <a:r>
-                <a:rPr lang="en-US" sz="1000" b="0" i="0" u="none" strike="noStrike" cap="none">
+                <a:rPr lang="en-US" sz="1000" b="0" i="0" u="none" strike="noStrike" cap="none" dirty="0">
                   <a:solidFill>
                     <a:schemeClr val="lt1"/>
                   </a:solidFill>
@@ -17805,9 +18454,9 @@
                   <a:cs typeface="Arial"/>
                   <a:sym typeface="Arial"/>
                 </a:rPr>
-                <a:t>Receive Order</a:t>
+                <a:t>Receives Order</a:t>
               </a:r>
-              <a:endParaRPr sz="1000"/>
+              <a:endParaRPr sz="1000" dirty="0"/>
             </a:p>
             <a:p>
               <a:pPr marL="0" marR="0" lvl="0" indent="0" algn="ctr" rtl="0">
@@ -17828,7 +18477,7 @@
                 <a:buNone/>
               </a:pPr>
               <a:r>
-                <a:rPr lang="en-US" sz="1000" b="0" i="0" u="none" strike="noStrike" cap="none">
+                <a:rPr lang="en-US" sz="1000" b="0" i="0" u="none" strike="noStrike" cap="none" dirty="0">
                   <a:solidFill>
                     <a:schemeClr val="lt1"/>
                   </a:solidFill>
@@ -17839,7 +18488,7 @@
                 </a:rPr>
                 <a:t>Send request to charge credit card</a:t>
               </a:r>
-              <a:endParaRPr sz="1000"/>
+              <a:endParaRPr sz="1000" dirty="0"/>
             </a:p>
             <a:p>
               <a:pPr marL="0" marR="0" lvl="0" indent="0" algn="ctr" rtl="0">
@@ -17860,7 +18509,7 @@
                 <a:buNone/>
               </a:pPr>
               <a:r>
-                <a:rPr lang="en-US" sz="1000" b="0" i="0" u="none" strike="noStrike" cap="none">
+                <a:rPr lang="en-US" sz="1000" b="0" i="0" u="none" strike="noStrike" cap="none" dirty="0">
                   <a:solidFill>
                     <a:schemeClr val="lt1"/>
                   </a:solidFill>
@@ -17871,7 +18520,7 @@
                 </a:rPr>
                 <a:t>If transaction is successful, ship order</a:t>
               </a:r>
-              <a:endParaRPr sz="1000"/>
+              <a:endParaRPr sz="1000" dirty="0"/>
             </a:p>
           </p:txBody>
         </p:sp>
@@ -18082,9 +18731,12 @@
                 <a:buNone/>
               </a:pPr>
               <a:r>
-                <a:rPr lang="en-US" sz="1200" b="0" i="0" u="none" strike="noStrike" cap="none">
+                <a:rPr lang="en-US" sz="1200" b="1" i="0" u="none" strike="noStrike" cap="none" dirty="0">
                   <a:solidFill>
-                    <a:schemeClr val="lt1"/>
+                    <a:schemeClr val="tx1">
+                      <a:lumMod val="85000"/>
+                      <a:lumOff val="15000"/>
+                    </a:schemeClr>
                   </a:solidFill>
                   <a:latin typeface="Arial"/>
                   <a:ea typeface="Arial"/>
@@ -18093,7 +18745,14 @@
                 </a:rPr>
                 <a:t>Tinder iOS app</a:t>
               </a:r>
-              <a:endParaRPr/>
+              <a:endParaRPr b="1" dirty="0">
+                <a:solidFill>
+                  <a:schemeClr val="tx1">
+                    <a:lumMod val="85000"/>
+                    <a:lumOff val="15000"/>
+                  </a:schemeClr>
+                </a:solidFill>
+              </a:endParaRPr>
             </a:p>
             <a:p>
               <a:pPr marL="0" marR="0" lvl="0" indent="0" algn="ctr" rtl="0">
@@ -18114,7 +18773,7 @@
                 <a:buNone/>
               </a:pPr>
               <a:r>
-                <a:rPr lang="en-US" sz="900" b="0" i="0" u="none" strike="noStrike" cap="none">
+                <a:rPr lang="en-US" sz="1050" b="0" i="0" u="none" strike="noStrike" cap="none" dirty="0">
                   <a:solidFill>
                     <a:schemeClr val="lt1"/>
                   </a:solidFill>
@@ -18125,7 +18784,7 @@
                 </a:rPr>
                 <a:t>Jon sees Chelsea and swipes right</a:t>
               </a:r>
-              <a:endParaRPr/>
+              <a:endParaRPr sz="1800" dirty="0"/>
             </a:p>
           </p:txBody>
         </p:sp>
@@ -18321,9 +18980,12 @@
                 <a:buNone/>
               </a:pPr>
               <a:r>
-                <a:rPr lang="en-US" sz="1200" b="0" i="0" u="none" strike="noStrike" cap="none">
+                <a:rPr lang="en-US" sz="1200" b="1" i="0" u="none" strike="noStrike" cap="none" dirty="0">
                   <a:solidFill>
-                    <a:schemeClr val="lt1"/>
+                    <a:schemeClr val="tx1">
+                      <a:lumMod val="85000"/>
+                      <a:lumOff val="15000"/>
+                    </a:schemeClr>
                   </a:solidFill>
                   <a:latin typeface="Arial"/>
                   <a:ea typeface="Arial"/>
@@ -18332,7 +18994,14 @@
                 </a:rPr>
                 <a:t>Tinder Server</a:t>
               </a:r>
-              <a:endParaRPr/>
+              <a:endParaRPr b="1" dirty="0">
+                <a:solidFill>
+                  <a:schemeClr val="tx1">
+                    <a:lumMod val="85000"/>
+                    <a:lumOff val="15000"/>
+                  </a:schemeClr>
+                </a:solidFill>
+              </a:endParaRPr>
             </a:p>
             <a:p>
               <a:pPr marL="0" marR="0" lvl="0" indent="0" algn="ctr" rtl="0">
@@ -18353,7 +19022,7 @@
                 <a:buNone/>
               </a:pPr>
               <a:r>
-                <a:rPr lang="en-US" sz="900" b="0" i="0" u="none" strike="noStrike" cap="none">
+                <a:rPr lang="en-US" sz="900" b="0" i="0" u="none" strike="noStrike" cap="none" dirty="0">
                   <a:solidFill>
                     <a:schemeClr val="lt1"/>
                   </a:solidFill>
@@ -18364,7 +19033,7 @@
                 </a:rPr>
                 <a:t>Chelsea swiped right before so match notification sent back to Tinder app on Jon’s phone</a:t>
               </a:r>
-              <a:endParaRPr/>
+              <a:endParaRPr dirty="0"/>
             </a:p>
           </p:txBody>
         </p:sp>
@@ -18575,9 +19244,12 @@
                 <a:buNone/>
               </a:pPr>
               <a:r>
-                <a:rPr lang="en-US" sz="1200" b="0" i="0" u="none" strike="noStrike" cap="none">
+                <a:rPr lang="en-US" sz="1200" b="1" i="0" u="none" strike="noStrike" cap="none" dirty="0">
                   <a:solidFill>
-                    <a:schemeClr val="lt1"/>
+                    <a:schemeClr val="tx1">
+                      <a:lumMod val="85000"/>
+                      <a:lumOff val="15000"/>
+                    </a:schemeClr>
                   </a:solidFill>
                   <a:latin typeface="Arial"/>
                   <a:ea typeface="Arial"/>
@@ -18586,7 +19258,14 @@
                 </a:rPr>
                 <a:t>Google Maps</a:t>
               </a:r>
-              <a:endParaRPr sz="1200"/>
+              <a:endParaRPr sz="1200" b="1" dirty="0">
+                <a:solidFill>
+                  <a:schemeClr val="tx1">
+                    <a:lumMod val="85000"/>
+                    <a:lumOff val="15000"/>
+                  </a:schemeClr>
+                </a:solidFill>
+              </a:endParaRPr>
             </a:p>
             <a:p>
               <a:pPr marL="0" marR="0" lvl="0" indent="0" algn="ctr" rtl="0">
@@ -18607,7 +19286,7 @@
                 <a:buNone/>
               </a:pPr>
               <a:r>
-                <a:rPr lang="en-US" sz="1200" b="0" i="0" u="none" strike="noStrike" cap="none">
+                <a:rPr lang="en-US" sz="1200" b="0" i="0" u="none" strike="noStrike" cap="none" dirty="0">
                   <a:solidFill>
                     <a:schemeClr val="lt1"/>
                   </a:solidFill>
@@ -18618,7 +19297,7 @@
                 </a:rPr>
                 <a:t>Shows Uber Pricing</a:t>
               </a:r>
-              <a:endParaRPr sz="1200"/>
+              <a:endParaRPr sz="1200" dirty="0"/>
             </a:p>
           </p:txBody>
         </p:sp>
@@ -18814,9 +19493,12 @@
                 <a:buNone/>
               </a:pPr>
               <a:r>
-                <a:rPr lang="en-US" sz="1200" b="0" i="0" u="none" strike="noStrike" cap="none">
+                <a:rPr lang="en-US" sz="1200" b="1" i="0" u="none" strike="noStrike" cap="none" dirty="0">
                   <a:solidFill>
-                    <a:schemeClr val="lt1"/>
+                    <a:schemeClr val="tx1">
+                      <a:lumMod val="85000"/>
+                      <a:lumOff val="15000"/>
+                    </a:schemeClr>
                   </a:solidFill>
                   <a:latin typeface="Arial"/>
                   <a:ea typeface="Arial"/>
@@ -18825,9 +19507,12 @@
                 </a:rPr>
                 <a:t>Uber Servers</a:t>
               </a:r>
-              <a:endParaRPr sz="900" b="0" i="0" u="none" strike="noStrike" cap="none">
+              <a:endParaRPr sz="900" b="1" i="0" u="none" strike="noStrike" cap="none" dirty="0">
                 <a:solidFill>
-                  <a:schemeClr val="lt1"/>
+                  <a:schemeClr val="tx1">
+                    <a:lumMod val="85000"/>
+                    <a:lumOff val="15000"/>
+                  </a:schemeClr>
                 </a:solidFill>
                 <a:latin typeface="Arial"/>
                 <a:ea typeface="Arial"/>
@@ -19128,7 +19813,7 @@
               <a:buNone/>
             </a:pPr>
             <a:r>
-              <a:rPr lang="en-US">
+              <a:rPr lang="en-US" dirty="0">
                 <a:latin typeface="Cabin"/>
                 <a:ea typeface="Cabin"/>
                 <a:cs typeface="Cabin"/>
@@ -19136,7 +19821,7 @@
               </a:rPr>
               <a:t>API</a:t>
             </a:r>
-            <a:endParaRPr>
+            <a:endParaRPr dirty="0">
               <a:latin typeface="Cabin"/>
               <a:ea typeface="Cabin"/>
               <a:cs typeface="Cabin"/>
@@ -19233,10 +19918,6 @@
           </p:nvPr>
         </p:nvSpPr>
         <p:spPr>
-          <a:xfrm>
-            <a:off x="311700" y="445025"/>
-            <a:ext cx="8520600" cy="572700"/>
-          </a:xfrm>
           <a:prstGeom prst="rect">
             <a:avLst/>
           </a:prstGeom>
@@ -19284,10 +19965,6 @@
           </p:nvPr>
         </p:nvSpPr>
         <p:spPr>
-          <a:xfrm>
-            <a:off x="8595308" y="4825067"/>
-            <a:ext cx="548700" cy="393600"/>
-          </a:xfrm>
           <a:prstGeom prst="rect">
             <a:avLst/>
           </a:prstGeom>
@@ -19513,6 +20190,53 @@
       </p:grpSpPr>
       <p:sp>
         <p:nvSpPr>
+          <p:cNvPr id="257" name="Google Shape;257;p22"/>
+          <p:cNvSpPr txBox="1">
+            <a:spLocks noGrp="1"/>
+          </p:cNvSpPr>
+          <p:nvPr>
+            <p:ph type="title"/>
+          </p:nvPr>
+        </p:nvSpPr>
+        <p:spPr>
+          <a:prstGeom prst="rect">
+            <a:avLst/>
+          </a:prstGeom>
+          <a:noFill/>
+          <a:ln>
+            <a:noFill/>
+          </a:ln>
+        </p:spPr>
+        <p:txBody>
+          <a:bodyPr spcFirstLastPara="1" wrap="square" lIns="91425" tIns="91425" rIns="91425" bIns="91425" anchor="t" anchorCtr="0">
+            <a:noAutofit/>
+          </a:bodyPr>
+          <a:lstStyle/>
+          <a:p>
+            <a:pPr marL="0" lvl="0" indent="0" algn="l" rtl="0">
+              <a:lnSpc>
+                <a:spcPct val="100000"/>
+              </a:lnSpc>
+              <a:spcBef>
+                <a:spcPts val="0"/>
+              </a:spcBef>
+              <a:spcAft>
+                <a:spcPts val="0"/>
+              </a:spcAft>
+              <a:buSzPts val="2800"/>
+              <a:buFont typeface="Cabin"/>
+              <a:buNone/>
+            </a:pPr>
+            <a:r>
+              <a:rPr lang="en-US" sz="2400" dirty="0"/>
+              <a:t>…and exist in many contexts </a:t>
+            </a:r>
+            <a:endParaRPr sz="2400" dirty="0"/>
+          </a:p>
+        </p:txBody>
+      </p:sp>
+      <p:sp>
+        <p:nvSpPr>
           <p:cNvPr id="256" name="Google Shape;256;p22"/>
           <p:cNvSpPr txBox="1">
             <a:spLocks noGrp="1"/>
@@ -19522,10 +20246,6 @@
           </p:nvPr>
         </p:nvSpPr>
         <p:spPr>
-          <a:xfrm>
-            <a:off x="8595308" y="4825067"/>
-            <a:ext cx="548700" cy="393600"/>
-          </a:xfrm>
           <a:prstGeom prst="rect">
             <a:avLst/>
           </a:prstGeom>
@@ -19559,57 +20279,6 @@
               <a:t>6</a:t>
             </a:fld>
             <a:endParaRPr/>
-          </a:p>
-        </p:txBody>
-      </p:sp>
-      <p:sp>
-        <p:nvSpPr>
-          <p:cNvPr id="257" name="Google Shape;257;p22"/>
-          <p:cNvSpPr txBox="1">
-            <a:spLocks noGrp="1"/>
-          </p:cNvSpPr>
-          <p:nvPr>
-            <p:ph type="title"/>
-          </p:nvPr>
-        </p:nvSpPr>
-        <p:spPr>
-          <a:xfrm>
-            <a:off x="311700" y="445025"/>
-            <a:ext cx="8520600" cy="572700"/>
-          </a:xfrm>
-          <a:prstGeom prst="rect">
-            <a:avLst/>
-          </a:prstGeom>
-          <a:noFill/>
-          <a:ln>
-            <a:noFill/>
-          </a:ln>
-        </p:spPr>
-        <p:txBody>
-          <a:bodyPr spcFirstLastPara="1" wrap="square" lIns="91425" tIns="91425" rIns="91425" bIns="91425" anchor="t" anchorCtr="0">
-            <a:noAutofit/>
-          </a:bodyPr>
-          <a:lstStyle/>
-          <a:p>
-            <a:pPr marL="0" lvl="0" indent="0" algn="l" rtl="0">
-              <a:lnSpc>
-                <a:spcPct val="100000"/>
-              </a:lnSpc>
-              <a:spcBef>
-                <a:spcPts val="0"/>
-              </a:spcBef>
-              <a:spcAft>
-                <a:spcPts val="0"/>
-              </a:spcAft>
-              <a:buSzPts val="2800"/>
-              <a:buFont typeface="Cabin"/>
-              <a:buNone/>
-            </a:pPr>
-            <a:r>
-              <a:rPr lang="en-US" sz="2400" dirty="0"/>
-              <a:t>…and exist in many contexts </a:t>
-            </a:r>
-            <a:endParaRPr sz="2400" dirty="0"/>
           </a:p>
         </p:txBody>
       </p:sp>
@@ -19713,7 +20382,7 @@
         </p:nvSpPr>
         <p:spPr>
           <a:xfrm>
-            <a:off x="7012504" y="324800"/>
+            <a:off x="6975146" y="566857"/>
             <a:ext cx="1857154" cy="954107"/>
           </a:xfrm>
           <a:prstGeom prst="rect">
@@ -19756,7 +20425,7 @@
         </p:nvSpPr>
         <p:spPr>
           <a:xfrm>
-            <a:off x="4987246" y="3162343"/>
+            <a:off x="4987246" y="3553245"/>
             <a:ext cx="1857154" cy="523220"/>
           </a:xfrm>
           <a:prstGeom prst="rect">
@@ -19904,7 +20573,7 @@
         </p:blipFill>
         <p:spPr bwMode="auto">
           <a:xfrm>
-            <a:off x="6458360" y="909868"/>
+            <a:off x="6423014" y="1166506"/>
             <a:ext cx="2600325" cy="1762125"/>
           </a:xfrm>
           <a:prstGeom prst="rect">
@@ -20082,6 +20751,53 @@
       </p:grpSpPr>
       <p:sp>
         <p:nvSpPr>
+          <p:cNvPr id="272" name="Google Shape;272;p23"/>
+          <p:cNvSpPr txBox="1">
+            <a:spLocks noGrp="1"/>
+          </p:cNvSpPr>
+          <p:nvPr>
+            <p:ph type="title"/>
+          </p:nvPr>
+        </p:nvSpPr>
+        <p:spPr>
+          <a:prstGeom prst="rect">
+            <a:avLst/>
+          </a:prstGeom>
+          <a:noFill/>
+          <a:ln>
+            <a:noFill/>
+          </a:ln>
+        </p:spPr>
+        <p:txBody>
+          <a:bodyPr spcFirstLastPara="1" wrap="square" lIns="91425" tIns="91425" rIns="91425" bIns="91425" anchor="t" anchorCtr="0">
+            <a:noAutofit/>
+          </a:bodyPr>
+          <a:lstStyle/>
+          <a:p>
+            <a:pPr marL="0" lvl="0" indent="0" algn="l" rtl="0">
+              <a:lnSpc>
+                <a:spcPct val="100000"/>
+              </a:lnSpc>
+              <a:spcBef>
+                <a:spcPts val="0"/>
+              </a:spcBef>
+              <a:spcAft>
+                <a:spcPts val="0"/>
+              </a:spcAft>
+              <a:buSzPts val="2800"/>
+              <a:buFont typeface="Cabin"/>
+              <a:buNone/>
+            </a:pPr>
+            <a:r>
+              <a:rPr lang="en-US" dirty="0"/>
+              <a:t>Web API’s</a:t>
+            </a:r>
+            <a:endParaRPr dirty="0"/>
+          </a:p>
+        </p:txBody>
+      </p:sp>
+      <p:sp>
+        <p:nvSpPr>
           <p:cNvPr id="271" name="Google Shape;271;p23"/>
           <p:cNvSpPr txBox="1">
             <a:spLocks noGrp="1"/>
@@ -20091,10 +20807,6 @@
           </p:nvPr>
         </p:nvSpPr>
         <p:spPr>
-          <a:xfrm>
-            <a:off x="8595308" y="4825067"/>
-            <a:ext cx="548700" cy="393600"/>
-          </a:xfrm>
           <a:prstGeom prst="rect">
             <a:avLst/>
           </a:prstGeom>
@@ -20128,57 +20840,6 @@
               <a:t>7</a:t>
             </a:fld>
             <a:endParaRPr/>
-          </a:p>
-        </p:txBody>
-      </p:sp>
-      <p:sp>
-        <p:nvSpPr>
-          <p:cNvPr id="272" name="Google Shape;272;p23"/>
-          <p:cNvSpPr txBox="1">
-            <a:spLocks noGrp="1"/>
-          </p:cNvSpPr>
-          <p:nvPr>
-            <p:ph type="title"/>
-          </p:nvPr>
-        </p:nvSpPr>
-        <p:spPr>
-          <a:xfrm>
-            <a:off x="311700" y="445025"/>
-            <a:ext cx="8520600" cy="572700"/>
-          </a:xfrm>
-          <a:prstGeom prst="rect">
-            <a:avLst/>
-          </a:prstGeom>
-          <a:noFill/>
-          <a:ln>
-            <a:noFill/>
-          </a:ln>
-        </p:spPr>
-        <p:txBody>
-          <a:bodyPr spcFirstLastPara="1" wrap="square" lIns="91425" tIns="91425" rIns="91425" bIns="91425" anchor="t" anchorCtr="0">
-            <a:noAutofit/>
-          </a:bodyPr>
-          <a:lstStyle/>
-          <a:p>
-            <a:pPr marL="0" lvl="0" indent="0" algn="l" rtl="0">
-              <a:lnSpc>
-                <a:spcPct val="100000"/>
-              </a:lnSpc>
-              <a:spcBef>
-                <a:spcPts val="0"/>
-              </a:spcBef>
-              <a:spcAft>
-                <a:spcPts val="0"/>
-              </a:spcAft>
-              <a:buSzPts val="2800"/>
-              <a:buFont typeface="Cabin"/>
-              <a:buNone/>
-            </a:pPr>
-            <a:r>
-              <a:rPr lang="en-US" dirty="0"/>
-              <a:t>Web API’s</a:t>
-            </a:r>
-            <a:endParaRPr dirty="0"/>
           </a:p>
         </p:txBody>
       </p:sp>
@@ -20382,10 +21043,6 @@
           </p:nvPr>
         </p:nvSpPr>
         <p:spPr>
-          <a:xfrm>
-            <a:off x="311700" y="2150850"/>
-            <a:ext cx="8520600" cy="841800"/>
-          </a:xfrm>
           <a:prstGeom prst="rect">
             <a:avLst/>
           </a:prstGeom>
@@ -20433,10 +21090,6 @@
           </p:nvPr>
         </p:nvSpPr>
         <p:spPr>
-          <a:xfrm>
-            <a:off x="8595308" y="4825067"/>
-            <a:ext cx="548700" cy="393600"/>
-          </a:xfrm>
           <a:prstGeom prst="rect">
             <a:avLst/>
           </a:prstGeom>
@@ -20514,10 +21167,6 @@
           </p:nvPr>
         </p:nvSpPr>
         <p:spPr>
-          <a:xfrm>
-            <a:off x="311700" y="445025"/>
-            <a:ext cx="8520600" cy="572700"/>
-          </a:xfrm>
           <a:prstGeom prst="rect">
             <a:avLst/>
           </a:prstGeom>
@@ -20601,7 +21250,7 @@
             </a:pPr>
             <a:r>
               <a:rPr lang="en-US" dirty="0"/>
-              <a:t>API’s are a window between your company’s application and the outside world!</a:t>
+              <a:t>API’s are a bridge between your company’s application and the outside world!</a:t>
             </a:r>
           </a:p>
           <a:p>
@@ -20636,10 +21285,6 @@
           </p:nvPr>
         </p:nvSpPr>
         <p:spPr>
-          <a:xfrm>
-            <a:off x="8595308" y="4825067"/>
-            <a:ext cx="548700" cy="393600"/>
-          </a:xfrm>
           <a:prstGeom prst="rect">
             <a:avLst/>
           </a:prstGeom>
@@ -20690,8 +21335,8 @@
         </p:nvSpPr>
         <p:spPr>
           <a:xfrm>
-            <a:off x="479394" y="1748899"/>
-            <a:ext cx="1846556" cy="523220"/>
+            <a:off x="1639026" y="1859925"/>
+            <a:ext cx="2113834" cy="2523768"/>
           </a:xfrm>
           <a:prstGeom prst="rect">
             <a:avLst/>
@@ -20711,9 +21356,57 @@
             </a:r>
           </a:p>
           <a:p>
+            <a:pPr algn="ctr"/>
+            <a:endParaRPr lang="en-US" b="1" dirty="0"/>
+          </a:p>
+          <a:p>
+            <a:pPr algn="ctr"/>
+            <a:endParaRPr lang="en-US" b="1" dirty="0"/>
+          </a:p>
+          <a:p>
+            <a:pPr algn="ctr"/>
             <a:r>
               <a:rPr lang="en-US" dirty="0"/>
               <a:t>Define the contract</a:t>
+            </a:r>
+          </a:p>
+          <a:p>
+            <a:endParaRPr lang="en-US" dirty="0"/>
+          </a:p>
+          <a:p>
+            <a:endParaRPr lang="en-US" dirty="0"/>
+          </a:p>
+          <a:p>
+            <a:endParaRPr lang="en-US" dirty="0"/>
+          </a:p>
+          <a:p>
+            <a:pPr marL="342900" indent="-342900">
+              <a:buFont typeface="+mj-lt"/>
+              <a:buAutoNum type="arabicPeriod"/>
+            </a:pPr>
+            <a:r>
+              <a:rPr lang="en-US" sz="1200" dirty="0"/>
+              <a:t>Define API Calls</a:t>
+            </a:r>
+          </a:p>
+          <a:p>
+            <a:pPr marL="342900" indent="-342900">
+              <a:buFont typeface="+mj-lt"/>
+              <a:buAutoNum type="arabicPeriod"/>
+            </a:pPr>
+            <a:r>
+              <a:rPr lang="en-US" sz="1200" dirty="0"/>
+              <a:t>Define data needed from requester</a:t>
+            </a:r>
+          </a:p>
+          <a:p>
+            <a:pPr marL="342900" indent="-342900">
+              <a:buFont typeface="+mj-lt"/>
+              <a:buAutoNum type="arabicPeriod"/>
+            </a:pPr>
+            <a:r>
+              <a:rPr lang="en-US" sz="1200" dirty="0"/>
+              <a:t>Define data to provide in return</a:t>
             </a:r>
           </a:p>
         </p:txBody>
@@ -20732,8 +21425,8 @@
         </p:nvSpPr>
         <p:spPr>
           <a:xfrm>
-            <a:off x="2725444" y="1767452"/>
-            <a:ext cx="1846556" cy="523220"/>
+            <a:off x="3752860" y="1843959"/>
+            <a:ext cx="2225500" cy="2339102"/>
           </a:xfrm>
           <a:prstGeom prst="rect">
             <a:avLst/>
@@ -20754,9 +21447,38 @@
           </a:p>
           <a:p>
             <a:pPr algn="ctr"/>
+            <a:endParaRPr lang="en-US" b="1" dirty="0"/>
+          </a:p>
+          <a:p>
+            <a:pPr algn="ctr"/>
+            <a:endParaRPr lang="en-US" b="1" dirty="0"/>
+          </a:p>
+          <a:p>
+            <a:pPr algn="ctr"/>
             <a:r>
               <a:rPr lang="en-US" dirty="0"/>
               <a:t>Present the contract</a:t>
+            </a:r>
+          </a:p>
+          <a:p>
+            <a:pPr algn="ctr"/>
+            <a:endParaRPr lang="en-US" dirty="0"/>
+          </a:p>
+          <a:p>
+            <a:pPr algn="ctr"/>
+            <a:endParaRPr lang="en-US" dirty="0"/>
+          </a:p>
+          <a:p>
+            <a:pPr algn="ctr"/>
+            <a:endParaRPr lang="en-US" dirty="0"/>
+          </a:p>
+          <a:p>
+            <a:endParaRPr lang="en-US" sz="1200" dirty="0"/>
+          </a:p>
+          <a:p>
+            <a:r>
+              <a:rPr lang="en-US" sz="1200" dirty="0"/>
+              <a:t>Create API documentation to educate the public how to interact with your system</a:t>
             </a:r>
           </a:p>
         </p:txBody>
@@ -20775,8 +21497,8 @@
         </p:nvSpPr>
         <p:spPr>
           <a:xfrm>
-            <a:off x="4971494" y="1725175"/>
-            <a:ext cx="1846556" cy="738664"/>
+            <a:off x="5978360" y="1839679"/>
+            <a:ext cx="2113833" cy="2523768"/>
           </a:xfrm>
           <a:prstGeom prst="rect">
             <a:avLst/>
@@ -20792,8 +21514,16 @@
             <a:pPr algn="ctr"/>
             <a:r>
               <a:rPr lang="en-US" b="1" dirty="0"/>
-              <a:t>Finance/Strategy</a:t>
+              <a:t>Finance &amp; Strategy</a:t>
             </a:r>
+          </a:p>
+          <a:p>
+            <a:pPr algn="ctr"/>
+            <a:endParaRPr lang="en-US" b="1" dirty="0"/>
+          </a:p>
+          <a:p>
+            <a:pPr algn="ctr"/>
+            <a:endParaRPr lang="en-US" b="1" dirty="0"/>
           </a:p>
           <a:p>
             <a:pPr algn="ctr"/>
@@ -20802,8 +21532,198 @@
               <a:t>Monetize based on the contract</a:t>
             </a:r>
           </a:p>
+          <a:p>
+            <a:pPr algn="ctr"/>
+            <a:endParaRPr lang="en-US" dirty="0"/>
+          </a:p>
+          <a:p>
+            <a:pPr algn="ctr"/>
+            <a:endParaRPr lang="en-US" dirty="0"/>
+          </a:p>
+          <a:p>
+            <a:pPr algn="ctr"/>
+            <a:endParaRPr lang="en-US" sz="1200" dirty="0"/>
+          </a:p>
+          <a:p>
+            <a:pPr algn="ctr"/>
+            <a:r>
+              <a:rPr lang="en-US" sz="1200" dirty="0"/>
+              <a:t>Determine usage policies, pricing tiers, throttles, expansion opportunities &amp; more</a:t>
+            </a:r>
+          </a:p>
         </p:txBody>
       </p:sp>
+      <p:sp>
+        <p:nvSpPr>
+          <p:cNvPr id="3" name="TextBox 2">
+            <a:extLst>
+              <a:ext uri="{FF2B5EF4-FFF2-40B4-BE49-F238E27FC236}">
+                <a16:creationId xmlns:a16="http://schemas.microsoft.com/office/drawing/2014/main" id="{F0EFAD9F-0A63-794B-B766-D48FD0AF3972}"/>
+              </a:ext>
+            </a:extLst>
+          </p:cNvPr>
+          <p:cNvSpPr txBox="1"/>
+          <p:nvPr/>
+        </p:nvSpPr>
+        <p:spPr>
+          <a:xfrm>
+            <a:off x="59748" y="2489279"/>
+            <a:ext cx="1579278" cy="1384995"/>
+          </a:xfrm>
+          <a:prstGeom prst="rect">
+            <a:avLst/>
+          </a:prstGeom>
+          <a:noFill/>
+        </p:spPr>
+        <p:txBody>
+          <a:bodyPr wrap="none" rtlCol="0">
+            <a:spAutoFit/>
+          </a:bodyPr>
+          <a:lstStyle/>
+          <a:p>
+            <a:r>
+              <a:rPr lang="en-US" dirty="0"/>
+              <a:t>Physical Contract</a:t>
+            </a:r>
+          </a:p>
+          <a:p>
+            <a:endParaRPr lang="en-US" dirty="0"/>
+          </a:p>
+          <a:p>
+            <a:endParaRPr lang="en-US" dirty="0"/>
+          </a:p>
+          <a:p>
+            <a:endParaRPr lang="en-US" dirty="0"/>
+          </a:p>
+          <a:p>
+            <a:endParaRPr lang="en-US" dirty="0"/>
+          </a:p>
+          <a:p>
+            <a:pPr algn="ctr"/>
+            <a:r>
+              <a:rPr lang="en-US" dirty="0"/>
+              <a:t>World of API’s</a:t>
+            </a:r>
+          </a:p>
+        </p:txBody>
+      </p:sp>
+      <p:cxnSp>
+        <p:nvCxnSpPr>
+          <p:cNvPr id="5" name="Straight Connector 4">
+            <a:extLst>
+              <a:ext uri="{FF2B5EF4-FFF2-40B4-BE49-F238E27FC236}">
+                <a16:creationId xmlns:a16="http://schemas.microsoft.com/office/drawing/2014/main" id="{A9CB79DD-FE40-314A-9FA4-6B278DB11557}"/>
+              </a:ext>
+            </a:extLst>
+          </p:cNvPr>
+          <p:cNvCxnSpPr>
+            <a:stCxn id="3" idx="3"/>
+          </p:cNvCxnSpPr>
+          <p:nvPr/>
+        </p:nvCxnSpPr>
+        <p:spPr>
+          <a:xfrm>
+            <a:off x="1639026" y="3181777"/>
+            <a:ext cx="6600848" cy="13486"/>
+          </a:xfrm>
+          <a:prstGeom prst="line">
+            <a:avLst/>
+          </a:prstGeom>
+          <a:ln w="28575"/>
+        </p:spPr>
+        <p:style>
+          <a:lnRef idx="1">
+            <a:schemeClr val="accent5"/>
+          </a:lnRef>
+          <a:fillRef idx="0">
+            <a:schemeClr val="accent5"/>
+          </a:fillRef>
+          <a:effectRef idx="0">
+            <a:schemeClr val="accent5"/>
+          </a:effectRef>
+          <a:fontRef idx="minor">
+            <a:schemeClr val="tx1"/>
+          </a:fontRef>
+        </p:style>
+      </p:cxnSp>
+      <p:cxnSp>
+        <p:nvCxnSpPr>
+          <p:cNvPr id="11" name="Straight Connector 10">
+            <a:extLst>
+              <a:ext uri="{FF2B5EF4-FFF2-40B4-BE49-F238E27FC236}">
+                <a16:creationId xmlns:a16="http://schemas.microsoft.com/office/drawing/2014/main" id="{DF9BAD8B-83AD-5846-92E0-8B4ACCF83A5F}"/>
+              </a:ext>
+            </a:extLst>
+          </p:cNvPr>
+          <p:cNvCxnSpPr>
+            <a:cxnSpLocks/>
+          </p:cNvCxnSpPr>
+          <p:nvPr/>
+        </p:nvCxnSpPr>
+        <p:spPr>
+          <a:xfrm flipV="1">
+            <a:off x="3688425" y="1961723"/>
+            <a:ext cx="0" cy="2523768"/>
+          </a:xfrm>
+          <a:prstGeom prst="line">
+            <a:avLst/>
+          </a:prstGeom>
+          <a:ln w="28575"/>
+        </p:spPr>
+        <p:style>
+          <a:lnRef idx="1">
+            <a:schemeClr val="accent5"/>
+          </a:lnRef>
+          <a:fillRef idx="0">
+            <a:schemeClr val="accent5"/>
+          </a:fillRef>
+          <a:effectRef idx="0">
+            <a:schemeClr val="accent5"/>
+          </a:effectRef>
+          <a:fontRef idx="minor">
+            <a:schemeClr val="tx1"/>
+          </a:fontRef>
+        </p:style>
+      </p:cxnSp>
+      <p:cxnSp>
+        <p:nvCxnSpPr>
+          <p:cNvPr id="14" name="Straight Connector 13">
+            <a:extLst>
+              <a:ext uri="{FF2B5EF4-FFF2-40B4-BE49-F238E27FC236}">
+                <a16:creationId xmlns:a16="http://schemas.microsoft.com/office/drawing/2014/main" id="{F7D94B99-BEE8-A34B-AA2D-8C05238074E7}"/>
+              </a:ext>
+            </a:extLst>
+          </p:cNvPr>
+          <p:cNvCxnSpPr>
+            <a:cxnSpLocks/>
+          </p:cNvCxnSpPr>
+          <p:nvPr/>
+        </p:nvCxnSpPr>
+        <p:spPr>
+          <a:xfrm flipV="1">
+            <a:off x="5895657" y="1919893"/>
+            <a:ext cx="0" cy="2523768"/>
+          </a:xfrm>
+          <a:prstGeom prst="line">
+            <a:avLst/>
+          </a:prstGeom>
+          <a:ln w="28575"/>
+        </p:spPr>
+        <p:style>
+          <a:lnRef idx="1">
+            <a:schemeClr val="accent5"/>
+          </a:lnRef>
+          <a:fillRef idx="0">
+            <a:schemeClr val="accent5"/>
+          </a:fillRef>
+          <a:effectRef idx="0">
+            <a:schemeClr val="accent5"/>
+          </a:effectRef>
+          <a:fontRef idx="minor">
+            <a:schemeClr val="tx1"/>
+          </a:fontRef>
+        </p:style>
+      </p:cxnSp>
     </p:spTree>
   </p:cSld>
   <p:clrMapOvr>
@@ -21372,4 +22292,186 @@
   <a:objectDefaults/>
   <a:extraClrSchemeLst/>
 </a:theme>
+</file>
+
+<file path=customXml/item1.xml><?xml version="1.0" encoding="utf-8"?>
+<p:properties xmlns:p="http://schemas.microsoft.com/office/2006/metadata/properties" xmlns:xsi="http://www.w3.org/2001/XMLSchema-instance" xmlns:pc="http://schemas.microsoft.com/office/infopath/2007/PartnerControls">
+  <documentManagement/>
+</p:properties>
+</file>
+
+<file path=customXml/item2.xml><?xml version="1.0" encoding="utf-8"?>
+<ct:contentTypeSchema xmlns:ct="http://schemas.microsoft.com/office/2006/metadata/contentType" xmlns:ma="http://schemas.microsoft.com/office/2006/metadata/properties/metaAttributes" ct:_="" ma:_="" ma:contentTypeName="Document" ma:contentTypeID="0x01010051D68B63F24A0B4794DFF1086BB500D6" ma:contentTypeVersion="2" ma:contentTypeDescription="Create a new document." ma:contentTypeScope="" ma:versionID="0346e033ff0b3c716cebc2d88569d9ff">
+  <xsd:schema xmlns:xsd="http://www.w3.org/2001/XMLSchema" xmlns:xs="http://www.w3.org/2001/XMLSchema" xmlns:p="http://schemas.microsoft.com/office/2006/metadata/properties" xmlns:ns2="2eeadf85-c797-4df2-bf0a-af4aed375ada" targetNamespace="http://schemas.microsoft.com/office/2006/metadata/properties" ma:root="true" ma:fieldsID="cdcf6b6461d226179ba3ffdd3f97612f" ns2:_="">
+    <xsd:import namespace="2eeadf85-c797-4df2-bf0a-af4aed375ada"/>
+    <xsd:element name="properties">
+      <xsd:complexType>
+        <xsd:sequence>
+          <xsd:element name="documentManagement">
+            <xsd:complexType>
+              <xsd:all>
+                <xsd:element ref="ns2:MediaServiceMetadata" minOccurs="0"/>
+                <xsd:element ref="ns2:MediaServiceFastMetadata" minOccurs="0"/>
+              </xsd:all>
+            </xsd:complexType>
+          </xsd:element>
+        </xsd:sequence>
+      </xsd:complexType>
+    </xsd:element>
+  </xsd:schema>
+  <xsd:schema xmlns:xsd="http://www.w3.org/2001/XMLSchema" xmlns:xs="http://www.w3.org/2001/XMLSchema" xmlns:dms="http://schemas.microsoft.com/office/2006/documentManagement/types" xmlns:pc="http://schemas.microsoft.com/office/infopath/2007/PartnerControls" targetNamespace="2eeadf85-c797-4df2-bf0a-af4aed375ada" elementFormDefault="qualified">
+    <xsd:import namespace="http://schemas.microsoft.com/office/2006/documentManagement/types"/>
+    <xsd:import namespace="http://schemas.microsoft.com/office/infopath/2007/PartnerControls"/>
+    <xsd:element name="MediaServiceMetadata" ma:index="8" nillable="true" ma:displayName="MediaServiceMetadata" ma:hidden="true" ma:internalName="MediaServiceMetadata" ma:readOnly="true">
+      <xsd:simpleType>
+        <xsd:restriction base="dms:Note"/>
+      </xsd:simpleType>
+    </xsd:element>
+    <xsd:element name="MediaServiceFastMetadata" ma:index="9" nillable="true" ma:displayName="MediaServiceFastMetadata" ma:hidden="true" ma:internalName="MediaServiceFastMetadata" ma:readOnly="true">
+      <xsd:simpleType>
+        <xsd:restriction base="dms:Note"/>
+      </xsd:simpleType>
+    </xsd:element>
+  </xsd:schema>
+  <xsd:schema xmlns="http://schemas.openxmlformats.org/package/2006/metadata/core-properties" xmlns:xsd="http://www.w3.org/2001/XMLSchema" xmlns:xsi="http://www.w3.org/2001/XMLSchema-instance" xmlns:dc="http://purl.org/dc/elements/1.1/" xmlns:dcterms="http://purl.org/dc/terms/" xmlns:odoc="http://schemas.microsoft.com/internal/obd" targetNamespace="http://schemas.openxmlformats.org/package/2006/metadata/core-properties" elementFormDefault="qualified" attributeFormDefault="unqualified" blockDefault="#all">
+    <xsd:import namespace="http://purl.org/dc/elements/1.1/" schemaLocation="http://dublincore.org/schemas/xmls/qdc/2003/04/02/dc.xsd"/>
+    <xsd:import namespace="http://purl.org/dc/terms/" schemaLocation="http://dublincore.org/schemas/xmls/qdc/2003/04/02/dcterms.xsd"/>
+    <xsd:element name="coreProperties" type="CT_coreProperties"/>
+    <xsd:complexType name="CT_coreProperties">
+      <xsd:all>
+        <xsd:element ref="dc:creator" minOccurs="0" maxOccurs="1"/>
+        <xsd:element ref="dcterms:created" minOccurs="0" maxOccurs="1"/>
+        <xsd:element ref="dc:identifier" minOccurs="0" maxOccurs="1"/>
+        <xsd:element name="contentType" minOccurs="0" maxOccurs="1" type="xsd:string" ma:index="0" ma:displayName="Content Type"/>
+        <xsd:element ref="dc:title" minOccurs="0" maxOccurs="1" ma:index="4" ma:displayName="Title"/>
+        <xsd:element ref="dc:subject" minOccurs="0" maxOccurs="1"/>
+        <xsd:element ref="dc:description" minOccurs="0" maxOccurs="1"/>
+        <xsd:element name="keywords" minOccurs="0" maxOccurs="1" type="xsd:string"/>
+        <xsd:element ref="dc:language" minOccurs="0" maxOccurs="1"/>
+        <xsd:element name="category" minOccurs="0" maxOccurs="1" type="xsd:string"/>
+        <xsd:element name="version" minOccurs="0" maxOccurs="1" type="xsd:string"/>
+        <xsd:element name="revision" minOccurs="0" maxOccurs="1" type="xsd:string">
+          <xsd:annotation>
+            <xsd:documentation>
+                        This value indicates the number of saves or revisions. The application is responsible for updating this value after each revision.
+                    </xsd:documentation>
+          </xsd:annotation>
+        </xsd:element>
+        <xsd:element name="lastModifiedBy" minOccurs="0" maxOccurs="1" type="xsd:string"/>
+        <xsd:element ref="dcterms:modified" minOccurs="0" maxOccurs="1"/>
+        <xsd:element name="contentStatus" minOccurs="0" maxOccurs="1" type="xsd:string"/>
+      </xsd:all>
+    </xsd:complexType>
+  </xsd:schema>
+  <xs:schema xmlns:pc="http://schemas.microsoft.com/office/infopath/2007/PartnerControls" xmlns:xs="http://www.w3.org/2001/XMLSchema" targetNamespace="http://schemas.microsoft.com/office/infopath/2007/PartnerControls" elementFormDefault="qualified" attributeFormDefault="unqualified">
+    <xs:element name="Person">
+      <xs:complexType>
+        <xs:sequence>
+          <xs:element ref="pc:DisplayName" minOccurs="0"/>
+          <xs:element ref="pc:AccountId" minOccurs="0"/>
+          <xs:element ref="pc:AccountType" minOccurs="0"/>
+        </xs:sequence>
+      </xs:complexType>
+    </xs:element>
+    <xs:element name="DisplayName" type="xs:string"/>
+    <xs:element name="AccountId" type="xs:string"/>
+    <xs:element name="AccountType" type="xs:string"/>
+    <xs:element name="BDCAssociatedEntity">
+      <xs:complexType>
+        <xs:sequence>
+          <xs:element ref="pc:BDCEntity" minOccurs="0" maxOccurs="unbounded"/>
+        </xs:sequence>
+        <xs:attribute ref="pc:EntityNamespace"/>
+        <xs:attribute ref="pc:EntityName"/>
+        <xs:attribute ref="pc:SystemInstanceName"/>
+        <xs:attribute ref="pc:AssociationName"/>
+      </xs:complexType>
+    </xs:element>
+    <xs:attribute name="EntityNamespace" type="xs:string"/>
+    <xs:attribute name="EntityName" type="xs:string"/>
+    <xs:attribute name="SystemInstanceName" type="xs:string"/>
+    <xs:attribute name="AssociationName" type="xs:string"/>
+    <xs:element name="BDCEntity">
+      <xs:complexType>
+        <xs:sequence>
+          <xs:element ref="pc:EntityDisplayName" minOccurs="0"/>
+          <xs:element ref="pc:EntityInstanceReference" minOccurs="0"/>
+          <xs:element ref="pc:EntityId1" minOccurs="0"/>
+          <xs:element ref="pc:EntityId2" minOccurs="0"/>
+          <xs:element ref="pc:EntityId3" minOccurs="0"/>
+          <xs:element ref="pc:EntityId4" minOccurs="0"/>
+          <xs:element ref="pc:EntityId5" minOccurs="0"/>
+        </xs:sequence>
+      </xs:complexType>
+    </xs:element>
+    <xs:element name="EntityDisplayName" type="xs:string"/>
+    <xs:element name="EntityInstanceReference" type="xs:string"/>
+    <xs:element name="EntityId1" type="xs:string"/>
+    <xs:element name="EntityId2" type="xs:string"/>
+    <xs:element name="EntityId3" type="xs:string"/>
+    <xs:element name="EntityId4" type="xs:string"/>
+    <xs:element name="EntityId5" type="xs:string"/>
+    <xs:element name="Terms">
+      <xs:complexType>
+        <xs:sequence>
+          <xs:element ref="pc:TermInfo" minOccurs="0" maxOccurs="unbounded"/>
+        </xs:sequence>
+      </xs:complexType>
+    </xs:element>
+    <xs:element name="TermInfo">
+      <xs:complexType>
+        <xs:sequence>
+          <xs:element ref="pc:TermName" minOccurs="0"/>
+          <xs:element ref="pc:TermId" minOccurs="0"/>
+        </xs:sequence>
+      </xs:complexType>
+    </xs:element>
+    <xs:element name="TermName" type="xs:string"/>
+    <xs:element name="TermId" type="xs:string"/>
+  </xs:schema>
+</ct:contentTypeSchema>
+</file>
+
+<file path=customXml/item3.xml><?xml version="1.0" encoding="utf-8"?>
+<?mso-contentType ?>
+<FormTemplates xmlns="http://schemas.microsoft.com/sharepoint/v3/contenttype/forms">
+  <Display>DocumentLibraryForm</Display>
+  <Edit>DocumentLibraryForm</Edit>
+  <New>DocumentLibraryForm</New>
+</FormTemplates>
+</file>
+
+<file path=customXml/itemProps1.xml><?xml version="1.0" encoding="utf-8"?>
+<ds:datastoreItem xmlns:ds="http://schemas.openxmlformats.org/officeDocument/2006/customXml" ds:itemID="{F7553753-2D7E-4128-B868-8E53410D9798}">
+  <ds:schemaRefs>
+    <ds:schemaRef ds:uri="http://schemas.microsoft.com/office/2006/metadata/properties"/>
+    <ds:schemaRef ds:uri="http://schemas.microsoft.com/office/infopath/2007/PartnerControls"/>
+  </ds:schemaRefs>
+</ds:datastoreItem>
+</file>
+
+<file path=customXml/itemProps2.xml><?xml version="1.0" encoding="utf-8"?>
+<ds:datastoreItem xmlns:ds="http://schemas.openxmlformats.org/officeDocument/2006/customXml" ds:itemID="{E2E48945-9876-4420-AA73-8F1FDED7D434}">
+  <ds:schemaRefs>
+    <ds:schemaRef ds:uri="http://schemas.microsoft.com/office/2006/metadata/contentType"/>
+    <ds:schemaRef ds:uri="http://schemas.microsoft.com/office/2006/metadata/properties/metaAttributes"/>
+    <ds:schemaRef ds:uri="http://www.w3.org/2001/XMLSchema"/>
+    <ds:schemaRef ds:uri="http://schemas.microsoft.com/office/2006/metadata/properties"/>
+    <ds:schemaRef ds:uri="2eeadf85-c797-4df2-bf0a-af4aed375ada"/>
+    <ds:schemaRef ds:uri="http://schemas.microsoft.com/office/2006/documentManagement/types"/>
+    <ds:schemaRef ds:uri="http://schemas.microsoft.com/office/infopath/2007/PartnerControls"/>
+    <ds:schemaRef ds:uri="http://schemas.openxmlformats.org/package/2006/metadata/core-properties"/>
+    <ds:schemaRef ds:uri="http://purl.org/dc/elements/1.1/"/>
+    <ds:schemaRef ds:uri="http://purl.org/dc/terms/"/>
+    <ds:schemaRef ds:uri="http://schemas.microsoft.com/internal/obd"/>
+  </ds:schemaRefs>
+</ds:datastoreItem>
+</file>
+
+<file path=customXml/itemProps3.xml><?xml version="1.0" encoding="utf-8"?>
+<ds:datastoreItem xmlns:ds="http://schemas.openxmlformats.org/officeDocument/2006/customXml" ds:itemID="{B898F39A-D3DC-4027-91BC-EC6CEC55232D}">
+  <ds:schemaRefs>
+    <ds:schemaRef ds:uri="http://schemas.microsoft.com/sharepoint/v3/contenttype/forms"/>
+  </ds:schemaRefs>
+</ds:datastoreItem>
 </file>
</xml_diff>